<commit_message>
Add files via upload (#47)
</commit_message>
<xml_diff>
--- a/ECML-2024/Slides/part4_similarity_search.pptx
+++ b/ECML-2024/Slides/part4_similarity_search.pptx
@@ -6,7 +6,7 @@
     <p:sldMasterId id="2147483661" r:id="rId2"/>
   </p:sldMasterIdLst>
   <p:notesMasterIdLst>
-    <p:notesMasterId r:id="rId24"/>
+    <p:notesMasterId r:id="rId25"/>
   </p:notesMasterIdLst>
   <p:sldIdLst>
     <p:sldId id="256" r:id="rId3"/>
@@ -25,19 +25,20 @@
     <p:sldId id="267" r:id="rId16"/>
     <p:sldId id="276" r:id="rId17"/>
     <p:sldId id="277" r:id="rId18"/>
-    <p:sldId id="269" r:id="rId19"/>
-    <p:sldId id="270" r:id="rId20"/>
-    <p:sldId id="271" r:id="rId21"/>
-    <p:sldId id="272" r:id="rId22"/>
-    <p:sldId id="273" r:id="rId23"/>
+    <p:sldId id="278" r:id="rId19"/>
+    <p:sldId id="269" r:id="rId20"/>
+    <p:sldId id="270" r:id="rId21"/>
+    <p:sldId id="271" r:id="rId22"/>
+    <p:sldId id="272" r:id="rId23"/>
+    <p:sldId id="273" r:id="rId24"/>
   </p:sldIdLst>
   <p:sldSz cx="9144000" cy="5143500" type="screen16x9"/>
   <p:notesSz cx="7559675" cy="10691813"/>
   <p:embeddedFontLst>
     <p:embeddedFont>
       <p:font typeface="Play" panose="020B0604020202020204" charset="0"/>
-      <p:regular r:id="rId25"/>
-      <p:bold r:id="rId26"/>
+      <p:regular r:id="rId26"/>
+      <p:bold r:id="rId27"/>
     </p:embeddedFont>
   </p:embeddedFontLst>
   <p:defaultTextStyle>
@@ -270,8 +271,11 @@
     </a:lvl9pPr>
   </p:defaultTextStyle>
   <p:extLst>
+    <p:ext uri="{EFAFB233-063F-42B5-8137-9DF3F51BA10A}">
+      <p15:sldGuideLst xmlns:p15="http://schemas.microsoft.com/office/powerpoint/2012/main"/>
+    </p:ext>
     <p:ext uri="GoogleSlidesCustomDataVersion2">
-      <go:slidesCustomData xmlns:go="http://customooxmlschemas.google.com/" xmlns:ahyp="http://schemas.microsoft.com/office/drawing/2018/hyperlinkcolor" xmlns:p15="http://schemas.microsoft.com/office/powerpoint/2012/main" xmlns:p14="http://schemas.microsoft.com/office/powerpoint/2010/main" xmlns:com="http://schemas.openxmlformats.org/drawingml/2006/compatibility" xmlns:pvml="urn:schemas-microsoft-com:office:powerpoint" xmlns:v="urn:schemas-microsoft-com:vml" xmlns:o="urn:schemas-microsoft-com:office:office" xmlns:dgm="http://schemas.openxmlformats.org/drawingml/2006/diagram" xmlns:c="http://schemas.openxmlformats.org/drawingml/2006/chart" xmlns:mv="urn:schemas-microsoft-com:mac:vml" xmlns:mc="http://schemas.openxmlformats.org/markup-compatibility/2006" xmlns="" r:id="rId27" roundtripDataSignature="AMtx7mjXkaOxpBdllwSmIqdcDSnsAXmUlQ=="/>
+      <go:slidesCustomData xmlns="" xmlns:mc="http://schemas.openxmlformats.org/markup-compatibility/2006" xmlns:mv="urn:schemas-microsoft-com:mac:vml" xmlns:c="http://schemas.openxmlformats.org/drawingml/2006/chart" xmlns:dgm="http://schemas.openxmlformats.org/drawingml/2006/diagram" xmlns:o="urn:schemas-microsoft-com:office:office" xmlns:v="urn:schemas-microsoft-com:vml" xmlns:pvml="urn:schemas-microsoft-com:office:powerpoint" xmlns:com="http://schemas.openxmlformats.org/drawingml/2006/compatibility" xmlns:p14="http://schemas.microsoft.com/office/powerpoint/2010/main" xmlns:p15="http://schemas.microsoft.com/office/powerpoint/2012/main" xmlns:ahyp="http://schemas.microsoft.com/office/drawing/2018/hyperlinkcolor" xmlns:go="http://customooxmlschemas.google.com/" r:id="rId28" roundtripDataSignature="AMtx7mjXkaOxpBdllwSmIqdcDSnsAXmUlQ=="/>
     </p:ext>
   </p:extLst>
 </p:presentation>
@@ -1773,6 +1777,169 @@
   <p:cSld>
     <p:spTree>
       <p:nvGrpSpPr>
+        <p:cNvPr id="1" name="Shape 247"/>
+        <p:cNvGrpSpPr/>
+        <p:nvPr/>
+      </p:nvGrpSpPr>
+      <p:grpSpPr>
+        <a:xfrm>
+          <a:off x="0" y="0"/>
+          <a:ext cx="0" cy="0"/>
+          <a:chOff x="0" y="0"/>
+          <a:chExt cx="0" cy="0"/>
+        </a:xfrm>
+      </p:grpSpPr>
+      <p:sp>
+        <p:nvSpPr>
+          <p:cNvPr id="248" name="Google Shape;248;g2fb95174dfe_0_158:notes"/>
+          <p:cNvSpPr txBox="1">
+            <a:spLocks noGrp="1"/>
+          </p:cNvSpPr>
+          <p:nvPr>
+            <p:ph type="body" idx="1"/>
+          </p:nvPr>
+        </p:nvSpPr>
+        <p:spPr>
+          <a:xfrm>
+            <a:off x="755950" y="5078600"/>
+            <a:ext cx="6047700" cy="4811400"/>
+          </a:xfrm>
+          <a:prstGeom prst="rect">
+            <a:avLst/>
+          </a:prstGeom>
+        </p:spPr>
+        <p:txBody>
+          <a:bodyPr spcFirstLastPara="1" wrap="square" lIns="91425" tIns="91425" rIns="91425" bIns="91425" anchor="t" anchorCtr="0">
+            <a:noAutofit/>
+          </a:bodyPr>
+          <a:lstStyle/>
+          <a:p>
+            <a:pPr marL="0" lvl="0" indent="0" algn="l" rtl="0">
+              <a:spcBef>
+                <a:spcPts val="0"/>
+              </a:spcBef>
+              <a:spcAft>
+                <a:spcPts val="0"/>
+              </a:spcAft>
+              <a:buNone/>
+            </a:pPr>
+            <a:r>
+              <a:rPr lang="en-US" sz="1100" dirty="0">
+                <a:solidFill>
+                  <a:schemeClr val="dk1"/>
+                </a:solidFill>
+              </a:rPr>
+              <a:t>It is possible to perform self-similarity search, in that case, we must take care of self-matches. </a:t>
+            </a:r>
+          </a:p>
+          <a:p>
+            <a:pPr marL="0" lvl="0" indent="0" algn="l" rtl="0">
+              <a:spcBef>
+                <a:spcPts val="0"/>
+              </a:spcBef>
+              <a:spcAft>
+                <a:spcPts val="0"/>
+              </a:spcAft>
+              <a:buNone/>
+            </a:pPr>
+            <a:endParaRPr lang="en-US" sz="1100" dirty="0">
+              <a:solidFill>
+                <a:schemeClr val="dk1"/>
+              </a:solidFill>
+            </a:endParaRPr>
+          </a:p>
+          <a:p>
+            <a:pPr marL="0" lvl="0" indent="0" algn="l" rtl="0">
+              <a:spcBef>
+                <a:spcPts val="0"/>
+              </a:spcBef>
+              <a:spcAft>
+                <a:spcPts val="0"/>
+              </a:spcAft>
+              <a:buNone/>
+            </a:pPr>
+            <a:r>
+              <a:rPr lang="en-US" sz="1100" dirty="0">
+                <a:solidFill>
+                  <a:schemeClr val="dk1"/>
+                </a:solidFill>
+              </a:rPr>
+              <a:t>Otherwise, the matrix profile would have been full of 0</a:t>
+            </a:r>
+          </a:p>
+          <a:p>
+            <a:pPr marL="0" lvl="0" indent="0" algn="l" rtl="0">
+              <a:spcBef>
+                <a:spcPts val="0"/>
+              </a:spcBef>
+              <a:spcAft>
+                <a:spcPts val="0"/>
+              </a:spcAft>
+              <a:buNone/>
+            </a:pPr>
+            <a:endParaRPr dirty="0"/>
+          </a:p>
+        </p:txBody>
+      </p:sp>
+      <p:sp>
+        <p:nvSpPr>
+          <p:cNvPr id="249" name="Google Shape;249;g2fb95174dfe_0_158:notes"/>
+          <p:cNvSpPr>
+            <a:spLocks noGrp="1" noRot="1" noChangeAspect="1"/>
+          </p:cNvSpPr>
+          <p:nvPr>
+            <p:ph type="sldImg" idx="2"/>
+          </p:nvPr>
+        </p:nvSpPr>
+        <p:spPr>
+          <a:xfrm>
+            <a:off x="217488" y="801688"/>
+            <a:ext cx="7126287" cy="4010025"/>
+          </a:xfrm>
+          <a:custGeom>
+            <a:avLst/>
+            <a:gdLst/>
+            <a:ahLst/>
+            <a:cxnLst/>
+            <a:rect l="l" t="t" r="r" b="b"/>
+            <a:pathLst>
+              <a:path w="120000" h="120000" extrusionOk="0">
+                <a:moveTo>
+                  <a:pt x="0" y="0"/>
+                </a:moveTo>
+                <a:lnTo>
+                  <a:pt x="120000" y="0"/>
+                </a:lnTo>
+                <a:lnTo>
+                  <a:pt x="120000" y="120000"/>
+                </a:lnTo>
+                <a:lnTo>
+                  <a:pt x="0" y="120000"/>
+                </a:lnTo>
+                <a:close/>
+              </a:path>
+            </a:pathLst>
+          </a:custGeom>
+        </p:spPr>
+      </p:sp>
+    </p:spTree>
+    <p:extLst>
+      <p:ext uri="{BB962C8B-B14F-4D97-AF65-F5344CB8AC3E}">
+        <p14:creationId xmlns:p14="http://schemas.microsoft.com/office/powerpoint/2010/main" val="2008627624"/>
+      </p:ext>
+    </p:extLst>
+  </p:cSld>
+  <p:clrMapOvr>
+    <a:masterClrMapping/>
+  </p:clrMapOvr>
+</p:notes>
+</file>
+
+<file path=ppt/notesSlides/notesSlide18.xml><?xml version="1.0" encoding="utf-8"?>
+<p:notes xmlns:a="http://schemas.openxmlformats.org/drawingml/2006/main" xmlns:r="http://schemas.openxmlformats.org/officeDocument/2006/relationships" xmlns:p="http://schemas.openxmlformats.org/presentationml/2006/main" showMasterSp="0" showMasterPhAnim="0">
+  <p:cSld>
+    <p:spTree>
+      <p:nvGrpSpPr>
         <p:cNvPr id="1" name="Shape 272"/>
         <p:cNvGrpSpPr/>
         <p:nvPr/>
@@ -1872,7 +2039,7 @@
 </p:notes>
 </file>
 
-<file path=ppt/notesSlides/notesSlide18.xml><?xml version="1.0" encoding="utf-8"?>
+<file path=ppt/notesSlides/notesSlide19.xml><?xml version="1.0" encoding="utf-8"?>
 <p:notes xmlns:a="http://schemas.openxmlformats.org/drawingml/2006/main" xmlns:r="http://schemas.openxmlformats.org/officeDocument/2006/relationships" xmlns:p="http://schemas.openxmlformats.org/presentationml/2006/main" showMasterSp="0" showMasterPhAnim="0">
   <p:cSld>
     <p:spTree>
@@ -1930,110 +2097,6 @@
       <p:sp>
         <p:nvSpPr>
           <p:cNvPr id="282" name="Google Shape;282;g2fb95174dfe_0_236:notes"/>
-          <p:cNvSpPr>
-            <a:spLocks noGrp="1" noRot="1" noChangeAspect="1"/>
-          </p:cNvSpPr>
-          <p:nvPr>
-            <p:ph type="sldImg" idx="2"/>
-          </p:nvPr>
-        </p:nvSpPr>
-        <p:spPr>
-          <a:xfrm>
-            <a:off x="217488" y="801688"/>
-            <a:ext cx="7126287" cy="4010025"/>
-          </a:xfrm>
-          <a:custGeom>
-            <a:avLst/>
-            <a:gdLst/>
-            <a:ahLst/>
-            <a:cxnLst/>
-            <a:rect l="l" t="t" r="r" b="b"/>
-            <a:pathLst>
-              <a:path w="120000" h="120000" extrusionOk="0">
-                <a:moveTo>
-                  <a:pt x="0" y="0"/>
-                </a:moveTo>
-                <a:lnTo>
-                  <a:pt x="120000" y="0"/>
-                </a:lnTo>
-                <a:lnTo>
-                  <a:pt x="120000" y="120000"/>
-                </a:lnTo>
-                <a:lnTo>
-                  <a:pt x="0" y="120000"/>
-                </a:lnTo>
-                <a:close/>
-              </a:path>
-            </a:pathLst>
-          </a:custGeom>
-        </p:spPr>
-      </p:sp>
-    </p:spTree>
-  </p:cSld>
-  <p:clrMapOvr>
-    <a:masterClrMapping/>
-  </p:clrMapOvr>
-</p:notes>
-</file>
-
-<file path=ppt/notesSlides/notesSlide19.xml><?xml version="1.0" encoding="utf-8"?>
-<p:notes xmlns:a="http://schemas.openxmlformats.org/drawingml/2006/main" xmlns:r="http://schemas.openxmlformats.org/officeDocument/2006/relationships" xmlns:p="http://schemas.openxmlformats.org/presentationml/2006/main" showMasterSp="0" showMasterPhAnim="0">
-  <p:cSld>
-    <p:spTree>
-      <p:nvGrpSpPr>
-        <p:cNvPr id="1" name="Shape 290"/>
-        <p:cNvGrpSpPr/>
-        <p:nvPr/>
-      </p:nvGrpSpPr>
-      <p:grpSpPr>
-        <a:xfrm>
-          <a:off x="0" y="0"/>
-          <a:ext cx="0" cy="0"/>
-          <a:chOff x="0" y="0"/>
-          <a:chExt cx="0" cy="0"/>
-        </a:xfrm>
-      </p:grpSpPr>
-      <p:sp>
-        <p:nvSpPr>
-          <p:cNvPr id="291" name="Google Shape;291;g2fb95174dfe_0_247:notes"/>
-          <p:cNvSpPr txBox="1">
-            <a:spLocks noGrp="1"/>
-          </p:cNvSpPr>
-          <p:nvPr>
-            <p:ph type="body" idx="1"/>
-          </p:nvPr>
-        </p:nvSpPr>
-        <p:spPr>
-          <a:xfrm>
-            <a:off x="755950" y="5078600"/>
-            <a:ext cx="6047700" cy="4811400"/>
-          </a:xfrm>
-          <a:prstGeom prst="rect">
-            <a:avLst/>
-          </a:prstGeom>
-        </p:spPr>
-        <p:txBody>
-          <a:bodyPr spcFirstLastPara="1" wrap="square" lIns="91425" tIns="91425" rIns="91425" bIns="91425" anchor="t" anchorCtr="0">
-            <a:noAutofit/>
-          </a:bodyPr>
-          <a:lstStyle/>
-          <a:p>
-            <a:pPr marL="0" lvl="0" indent="0" algn="l" rtl="0">
-              <a:spcBef>
-                <a:spcPts val="0"/>
-              </a:spcBef>
-              <a:spcAft>
-                <a:spcPts val="0"/>
-              </a:spcAft>
-              <a:buNone/>
-            </a:pPr>
-            <a:endParaRPr/>
-          </a:p>
-        </p:txBody>
-      </p:sp>
-      <p:sp>
-        <p:nvSpPr>
-          <p:cNvPr id="292" name="Google Shape;292;g2fb95174dfe_0_247:notes"/>
           <p:cNvSpPr>
             <a:spLocks noGrp="1" noRot="1" noChangeAspect="1"/>
           </p:cNvSpPr>
@@ -2189,6 +2252,110 @@
   <p:cSld>
     <p:spTree>
       <p:nvGrpSpPr>
+        <p:cNvPr id="1" name="Shape 290"/>
+        <p:cNvGrpSpPr/>
+        <p:nvPr/>
+      </p:nvGrpSpPr>
+      <p:grpSpPr>
+        <a:xfrm>
+          <a:off x="0" y="0"/>
+          <a:ext cx="0" cy="0"/>
+          <a:chOff x="0" y="0"/>
+          <a:chExt cx="0" cy="0"/>
+        </a:xfrm>
+      </p:grpSpPr>
+      <p:sp>
+        <p:nvSpPr>
+          <p:cNvPr id="291" name="Google Shape;291;g2fb95174dfe_0_247:notes"/>
+          <p:cNvSpPr txBox="1">
+            <a:spLocks noGrp="1"/>
+          </p:cNvSpPr>
+          <p:nvPr>
+            <p:ph type="body" idx="1"/>
+          </p:nvPr>
+        </p:nvSpPr>
+        <p:spPr>
+          <a:xfrm>
+            <a:off x="755950" y="5078600"/>
+            <a:ext cx="6047700" cy="4811400"/>
+          </a:xfrm>
+          <a:prstGeom prst="rect">
+            <a:avLst/>
+          </a:prstGeom>
+        </p:spPr>
+        <p:txBody>
+          <a:bodyPr spcFirstLastPara="1" wrap="square" lIns="91425" tIns="91425" rIns="91425" bIns="91425" anchor="t" anchorCtr="0">
+            <a:noAutofit/>
+          </a:bodyPr>
+          <a:lstStyle/>
+          <a:p>
+            <a:pPr marL="0" lvl="0" indent="0" algn="l" rtl="0">
+              <a:spcBef>
+                <a:spcPts val="0"/>
+              </a:spcBef>
+              <a:spcAft>
+                <a:spcPts val="0"/>
+              </a:spcAft>
+              <a:buNone/>
+            </a:pPr>
+            <a:endParaRPr/>
+          </a:p>
+        </p:txBody>
+      </p:sp>
+      <p:sp>
+        <p:nvSpPr>
+          <p:cNvPr id="292" name="Google Shape;292;g2fb95174dfe_0_247:notes"/>
+          <p:cNvSpPr>
+            <a:spLocks noGrp="1" noRot="1" noChangeAspect="1"/>
+          </p:cNvSpPr>
+          <p:nvPr>
+            <p:ph type="sldImg" idx="2"/>
+          </p:nvPr>
+        </p:nvSpPr>
+        <p:spPr>
+          <a:xfrm>
+            <a:off x="217488" y="801688"/>
+            <a:ext cx="7126287" cy="4010025"/>
+          </a:xfrm>
+          <a:custGeom>
+            <a:avLst/>
+            <a:gdLst/>
+            <a:ahLst/>
+            <a:cxnLst/>
+            <a:rect l="l" t="t" r="r" b="b"/>
+            <a:pathLst>
+              <a:path w="120000" h="120000" extrusionOk="0">
+                <a:moveTo>
+                  <a:pt x="0" y="0"/>
+                </a:moveTo>
+                <a:lnTo>
+                  <a:pt x="120000" y="0"/>
+                </a:lnTo>
+                <a:lnTo>
+                  <a:pt x="120000" y="120000"/>
+                </a:lnTo>
+                <a:lnTo>
+                  <a:pt x="0" y="120000"/>
+                </a:lnTo>
+                <a:close/>
+              </a:path>
+            </a:pathLst>
+          </a:custGeom>
+        </p:spPr>
+      </p:sp>
+    </p:spTree>
+  </p:cSld>
+  <p:clrMapOvr>
+    <a:masterClrMapping/>
+  </p:clrMapOvr>
+</p:notes>
+</file>
+
+<file path=ppt/notesSlides/notesSlide21.xml><?xml version="1.0" encoding="utf-8"?>
+<p:notes xmlns:a="http://schemas.openxmlformats.org/drawingml/2006/main" xmlns:r="http://schemas.openxmlformats.org/officeDocument/2006/relationships" xmlns:p="http://schemas.openxmlformats.org/presentationml/2006/main" showMasterSp="0" showMasterPhAnim="0">
+  <p:cSld>
+    <p:spTree>
+      <p:nvGrpSpPr>
         <p:cNvPr id="1" name="Shape 298"/>
         <p:cNvGrpSpPr/>
         <p:nvPr/>
@@ -2288,7 +2455,7 @@
 </p:notes>
 </file>
 
-<file path=ppt/notesSlides/notesSlide21.xml><?xml version="1.0" encoding="utf-8"?>
+<file path=ppt/notesSlides/notesSlide22.xml><?xml version="1.0" encoding="utf-8"?>
 <p:notes xmlns:a="http://schemas.openxmlformats.org/drawingml/2006/main" xmlns:r="http://schemas.openxmlformats.org/officeDocument/2006/relationships" xmlns:p="http://schemas.openxmlformats.org/presentationml/2006/main" showMasterSp="0" showMasterPhAnim="0">
   <p:cSld>
     <p:spTree>
@@ -23232,7 +23399,7 @@
                   <a:schemeClr val="dk1"/>
                 </a:solidFill>
               </a:rPr>
-              <a:t>Expand on the uses of matrix profiles (</a:t>
+              <a:t>Expand on the uses of matrix profiles (Next section </a:t>
             </a:r>
             <a:r>
               <a:rPr lang="fr-FR" dirty="0" err="1">
@@ -23240,7 +23407,7 @@
                   <a:schemeClr val="dk1"/>
                 </a:solidFill>
               </a:rPr>
-              <a:t>stumpy</a:t>
+              <a:t>will</a:t>
             </a:r>
             <a:r>
               <a:rPr lang="fr-FR" dirty="0">
@@ -23248,7 +23415,7 @@
                   <a:schemeClr val="dk1"/>
                 </a:solidFill>
               </a:rPr>
-              <a:t> has excellent </a:t>
+              <a:t> cover </a:t>
             </a:r>
             <a:r>
               <a:rPr lang="fr-FR" dirty="0" err="1">
@@ -23256,7 +23423,7 @@
                   <a:schemeClr val="dk1"/>
                 </a:solidFill>
               </a:rPr>
-              <a:t>tutorials</a:t>
+              <a:t>some</a:t>
             </a:r>
             <a:r>
               <a:rPr lang="fr-FR" dirty="0">
@@ -23264,7 +23431,7 @@
                   <a:schemeClr val="dk1"/>
                 </a:solidFill>
               </a:rPr>
-              <a:t> on </a:t>
+              <a:t> of </a:t>
             </a:r>
             <a:r>
               <a:rPr lang="fr-FR" dirty="0" err="1">
@@ -23272,7 +23439,7 @@
                   <a:schemeClr val="dk1"/>
                 </a:solidFill>
               </a:rPr>
-              <a:t>this</a:t>
+              <a:t>them</a:t>
             </a:r>
             <a:r>
               <a:rPr lang="fr-FR" dirty="0">
@@ -23280,7 +23447,7 @@
                   <a:schemeClr val="dk1"/>
                 </a:solidFill>
               </a:rPr>
-              <a:t>)</a:t>
+              <a:t> !)</a:t>
             </a:r>
             <a:endParaRPr b="1" dirty="0"/>
           </a:p>
@@ -23618,6 +23785,55 @@
           </a:p>
         </p:txBody>
       </p:sp>
+      <p:sp>
+        <p:nvSpPr>
+          <p:cNvPr id="2" name="Rectangle 1">
+            <a:extLst>
+              <a:ext uri="{FF2B5EF4-FFF2-40B4-BE49-F238E27FC236}">
+                <a16:creationId xmlns:a16="http://schemas.microsoft.com/office/drawing/2014/main" id="{0E776E56-49AF-4FB5-F9D9-A76AADA42C25}"/>
+              </a:ext>
+            </a:extLst>
+          </p:cNvPr>
+          <p:cNvSpPr/>
+          <p:nvPr/>
+        </p:nvSpPr>
+        <p:spPr>
+          <a:xfrm>
+            <a:off x="6792685" y="4931229"/>
+            <a:ext cx="2359479" cy="204107"/>
+          </a:xfrm>
+          <a:prstGeom prst="rect">
+            <a:avLst/>
+          </a:prstGeom>
+          <a:ln>
+            <a:solidFill>
+              <a:schemeClr val="bg1"/>
+            </a:solidFill>
+          </a:ln>
+        </p:spPr>
+        <p:style>
+          <a:lnRef idx="2">
+            <a:schemeClr val="accent6"/>
+          </a:lnRef>
+          <a:fillRef idx="1">
+            <a:schemeClr val="lt1"/>
+          </a:fillRef>
+          <a:effectRef idx="0">
+            <a:schemeClr val="accent6"/>
+          </a:effectRef>
+          <a:fontRef idx="minor">
+            <a:schemeClr val="dk1"/>
+          </a:fontRef>
+        </p:style>
+        <p:txBody>
+          <a:bodyPr rtlCol="0" anchor="ctr"/>
+          <a:lstStyle/>
+          <a:p>
+            <a:pPr algn="ctr"/>
+            <a:endParaRPr lang="fr-FR"/>
+          </a:p>
+        </p:txBody>
+      </p:sp>
     </p:spTree>
   </p:cSld>
   <p:clrMapOvr>
@@ -23643,6 +23859,55 @@
           <a:chExt cx="0" cy="0"/>
         </a:xfrm>
       </p:grpSpPr>
+      <p:sp>
+        <p:nvSpPr>
+          <p:cNvPr id="2" name="Rectangle 1">
+            <a:extLst>
+              <a:ext uri="{FF2B5EF4-FFF2-40B4-BE49-F238E27FC236}">
+                <a16:creationId xmlns:a16="http://schemas.microsoft.com/office/drawing/2014/main" id="{F7D1B73B-C283-5EAF-2856-71497FBD15D3}"/>
+              </a:ext>
+            </a:extLst>
+          </p:cNvPr>
+          <p:cNvSpPr/>
+          <p:nvPr/>
+        </p:nvSpPr>
+        <p:spPr>
+          <a:xfrm>
+            <a:off x="6792685" y="4931229"/>
+            <a:ext cx="2359479" cy="204107"/>
+          </a:xfrm>
+          <a:prstGeom prst="rect">
+            <a:avLst/>
+          </a:prstGeom>
+          <a:ln>
+            <a:solidFill>
+              <a:schemeClr val="bg1"/>
+            </a:solidFill>
+          </a:ln>
+        </p:spPr>
+        <p:style>
+          <a:lnRef idx="2">
+            <a:schemeClr val="accent6"/>
+          </a:lnRef>
+          <a:fillRef idx="1">
+            <a:schemeClr val="lt1"/>
+          </a:fillRef>
+          <a:effectRef idx="0">
+            <a:schemeClr val="accent6"/>
+          </a:effectRef>
+          <a:fontRef idx="minor">
+            <a:schemeClr val="dk1"/>
+          </a:fontRef>
+        </p:style>
+        <p:txBody>
+          <a:bodyPr rtlCol="0" anchor="ctr"/>
+          <a:lstStyle/>
+          <a:p>
+            <a:pPr algn="ctr"/>
+            <a:endParaRPr lang="fr-FR"/>
+          </a:p>
+        </p:txBody>
+      </p:sp>
       <p:sp>
         <p:nvSpPr>
           <p:cNvPr id="209" name="Google Shape;209;g2fb95174dfe_0_48"/>
@@ -25435,6 +25700,55 @@
           </a:p>
         </p:txBody>
       </p:sp>
+      <p:sp>
+        <p:nvSpPr>
+          <p:cNvPr id="2" name="Rectangle 1">
+            <a:extLst>
+              <a:ext uri="{FF2B5EF4-FFF2-40B4-BE49-F238E27FC236}">
+                <a16:creationId xmlns:a16="http://schemas.microsoft.com/office/drawing/2014/main" id="{74FA3CE5-6A81-3422-E4C0-4EE6D36C935B}"/>
+              </a:ext>
+            </a:extLst>
+          </p:cNvPr>
+          <p:cNvSpPr/>
+          <p:nvPr/>
+        </p:nvSpPr>
+        <p:spPr>
+          <a:xfrm>
+            <a:off x="6792685" y="4931229"/>
+            <a:ext cx="2359479" cy="204107"/>
+          </a:xfrm>
+          <a:prstGeom prst="rect">
+            <a:avLst/>
+          </a:prstGeom>
+          <a:ln>
+            <a:solidFill>
+              <a:schemeClr val="bg1"/>
+            </a:solidFill>
+          </a:ln>
+        </p:spPr>
+        <p:style>
+          <a:lnRef idx="2">
+            <a:schemeClr val="accent6"/>
+          </a:lnRef>
+          <a:fillRef idx="1">
+            <a:schemeClr val="lt1"/>
+          </a:fillRef>
+          <a:effectRef idx="0">
+            <a:schemeClr val="accent6"/>
+          </a:effectRef>
+          <a:fontRef idx="minor">
+            <a:schemeClr val="dk1"/>
+          </a:fontRef>
+        </p:style>
+        <p:txBody>
+          <a:bodyPr rtlCol="0" anchor="ctr"/>
+          <a:lstStyle/>
+          <a:p>
+            <a:pPr algn="ctr"/>
+            <a:endParaRPr lang="fr-FR"/>
+          </a:p>
+        </p:txBody>
+      </p:sp>
     </p:spTree>
   </p:cSld>
   <p:clrMapOvr>
@@ -26471,6 +26785,55 @@
           </a:p>
         </p:txBody>
       </p:sp>
+      <p:sp>
+        <p:nvSpPr>
+          <p:cNvPr id="2" name="Rectangle 1">
+            <a:extLst>
+              <a:ext uri="{FF2B5EF4-FFF2-40B4-BE49-F238E27FC236}">
+                <a16:creationId xmlns:a16="http://schemas.microsoft.com/office/drawing/2014/main" id="{5C81D2A7-1262-3B06-787D-B512285DB754}"/>
+              </a:ext>
+            </a:extLst>
+          </p:cNvPr>
+          <p:cNvSpPr/>
+          <p:nvPr/>
+        </p:nvSpPr>
+        <p:spPr>
+          <a:xfrm>
+            <a:off x="6792685" y="4931229"/>
+            <a:ext cx="2359479" cy="204107"/>
+          </a:xfrm>
+          <a:prstGeom prst="rect">
+            <a:avLst/>
+          </a:prstGeom>
+          <a:ln>
+            <a:solidFill>
+              <a:schemeClr val="bg1"/>
+            </a:solidFill>
+          </a:ln>
+        </p:spPr>
+        <p:style>
+          <a:lnRef idx="2">
+            <a:schemeClr val="accent6"/>
+          </a:lnRef>
+          <a:fillRef idx="1">
+            <a:schemeClr val="lt1"/>
+          </a:fillRef>
+          <a:effectRef idx="0">
+            <a:schemeClr val="accent6"/>
+          </a:effectRef>
+          <a:fontRef idx="minor">
+            <a:schemeClr val="dk1"/>
+          </a:fontRef>
+        </p:style>
+        <p:txBody>
+          <a:bodyPr rtlCol="0" anchor="ctr"/>
+          <a:lstStyle/>
+          <a:p>
+            <a:pPr algn="ctr"/>
+            <a:endParaRPr lang="fr-FR"/>
+          </a:p>
+        </p:txBody>
+      </p:sp>
     </p:spTree>
   </p:cSld>
   <p:clrMapOvr>
@@ -26496,6 +26859,55 @@
           <a:chExt cx="0" cy="0"/>
         </a:xfrm>
       </p:grpSpPr>
+      <p:sp>
+        <p:nvSpPr>
+          <p:cNvPr id="3" name="Rectangle 2">
+            <a:extLst>
+              <a:ext uri="{FF2B5EF4-FFF2-40B4-BE49-F238E27FC236}">
+                <a16:creationId xmlns:a16="http://schemas.microsoft.com/office/drawing/2014/main" id="{F08348A3-C986-3F0A-BA29-D19CB8E5A7C8}"/>
+              </a:ext>
+            </a:extLst>
+          </p:cNvPr>
+          <p:cNvSpPr/>
+          <p:nvPr/>
+        </p:nvSpPr>
+        <p:spPr>
+          <a:xfrm>
+            <a:off x="6792685" y="4931229"/>
+            <a:ext cx="2359479" cy="204107"/>
+          </a:xfrm>
+          <a:prstGeom prst="rect">
+            <a:avLst/>
+          </a:prstGeom>
+          <a:ln>
+            <a:solidFill>
+              <a:schemeClr val="bg1"/>
+            </a:solidFill>
+          </a:ln>
+        </p:spPr>
+        <p:style>
+          <a:lnRef idx="2">
+            <a:schemeClr val="accent6"/>
+          </a:lnRef>
+          <a:fillRef idx="1">
+            <a:schemeClr val="lt1"/>
+          </a:fillRef>
+          <a:effectRef idx="0">
+            <a:schemeClr val="accent6"/>
+          </a:effectRef>
+          <a:fontRef idx="minor">
+            <a:schemeClr val="dk1"/>
+          </a:fontRef>
+        </p:style>
+        <p:txBody>
+          <a:bodyPr rtlCol="0" anchor="ctr"/>
+          <a:lstStyle/>
+          <a:p>
+            <a:pPr algn="ctr"/>
+            <a:endParaRPr lang="fr-FR"/>
+          </a:p>
+        </p:txBody>
+      </p:sp>
       <p:sp>
         <p:nvSpPr>
           <p:cNvPr id="236" name="Google Shape;236;g2fb95174dfe_0_55"/>
@@ -27041,6 +27453,55 @@
           <a:chExt cx="0" cy="0"/>
         </a:xfrm>
       </p:grpSpPr>
+      <p:sp>
+        <p:nvSpPr>
+          <p:cNvPr id="3" name="Rectangle 2">
+            <a:extLst>
+              <a:ext uri="{FF2B5EF4-FFF2-40B4-BE49-F238E27FC236}">
+                <a16:creationId xmlns:a16="http://schemas.microsoft.com/office/drawing/2014/main" id="{2712CB91-7DDE-F7E1-F529-4830AB667B39}"/>
+              </a:ext>
+            </a:extLst>
+          </p:cNvPr>
+          <p:cNvSpPr/>
+          <p:nvPr/>
+        </p:nvSpPr>
+        <p:spPr>
+          <a:xfrm>
+            <a:off x="6792685" y="4931229"/>
+            <a:ext cx="2359479" cy="204107"/>
+          </a:xfrm>
+          <a:prstGeom prst="rect">
+            <a:avLst/>
+          </a:prstGeom>
+          <a:ln>
+            <a:solidFill>
+              <a:schemeClr val="bg1"/>
+            </a:solidFill>
+          </a:ln>
+        </p:spPr>
+        <p:style>
+          <a:lnRef idx="2">
+            <a:schemeClr val="accent6"/>
+          </a:lnRef>
+          <a:fillRef idx="1">
+            <a:schemeClr val="lt1"/>
+          </a:fillRef>
+          <a:effectRef idx="0">
+            <a:schemeClr val="accent6"/>
+          </a:effectRef>
+          <a:fontRef idx="minor">
+            <a:schemeClr val="dk1"/>
+          </a:fontRef>
+        </p:style>
+        <p:txBody>
+          <a:bodyPr rtlCol="0" anchor="ctr"/>
+          <a:lstStyle/>
+          <a:p>
+            <a:pPr algn="ctr"/>
+            <a:endParaRPr lang="fr-FR"/>
+          </a:p>
+        </p:txBody>
+      </p:sp>
       <p:pic>
         <p:nvPicPr>
           <p:cNvPr id="251" name="Google Shape;251;g2fb95174dfe_0_158"/>
@@ -27506,6 +27967,55 @@
           <a:chExt cx="0" cy="0"/>
         </a:xfrm>
       </p:grpSpPr>
+      <p:sp>
+        <p:nvSpPr>
+          <p:cNvPr id="4" name="Rectangle 3">
+            <a:extLst>
+              <a:ext uri="{FF2B5EF4-FFF2-40B4-BE49-F238E27FC236}">
+                <a16:creationId xmlns:a16="http://schemas.microsoft.com/office/drawing/2014/main" id="{36EDAD55-24E1-7534-125F-FD4A4C0A033E}"/>
+              </a:ext>
+            </a:extLst>
+          </p:cNvPr>
+          <p:cNvSpPr/>
+          <p:nvPr/>
+        </p:nvSpPr>
+        <p:spPr>
+          <a:xfrm>
+            <a:off x="6792685" y="4931229"/>
+            <a:ext cx="2359479" cy="204107"/>
+          </a:xfrm>
+          <a:prstGeom prst="rect">
+            <a:avLst/>
+          </a:prstGeom>
+          <a:ln>
+            <a:solidFill>
+              <a:schemeClr val="bg1"/>
+            </a:solidFill>
+          </a:ln>
+        </p:spPr>
+        <p:style>
+          <a:lnRef idx="2">
+            <a:schemeClr val="accent6"/>
+          </a:lnRef>
+          <a:fillRef idx="1">
+            <a:schemeClr val="lt1"/>
+          </a:fillRef>
+          <a:effectRef idx="0">
+            <a:schemeClr val="accent6"/>
+          </a:effectRef>
+          <a:fontRef idx="minor">
+            <a:schemeClr val="dk1"/>
+          </a:fontRef>
+        </p:style>
+        <p:txBody>
+          <a:bodyPr rtlCol="0" anchor="ctr"/>
+          <a:lstStyle/>
+          <a:p>
+            <a:pPr algn="ctr"/>
+            <a:endParaRPr lang="fr-FR"/>
+          </a:p>
+        </p:txBody>
+      </p:sp>
       <p:pic>
         <p:nvPicPr>
           <p:cNvPr id="251" name="Google Shape;251;g2fb95174dfe_0_158"/>
@@ -28294,6 +28804,55 @@
       </p:sp>
       <p:sp>
         <p:nvSpPr>
+          <p:cNvPr id="5" name="Rectangle 4">
+            <a:extLst>
+              <a:ext uri="{FF2B5EF4-FFF2-40B4-BE49-F238E27FC236}">
+                <a16:creationId xmlns:a16="http://schemas.microsoft.com/office/drawing/2014/main" id="{1A3A2962-256A-145A-D357-2AF7C4A39509}"/>
+              </a:ext>
+            </a:extLst>
+          </p:cNvPr>
+          <p:cNvSpPr/>
+          <p:nvPr/>
+        </p:nvSpPr>
+        <p:spPr>
+          <a:xfrm>
+            <a:off x="6792685" y="4931229"/>
+            <a:ext cx="2359479" cy="204107"/>
+          </a:xfrm>
+          <a:prstGeom prst="rect">
+            <a:avLst/>
+          </a:prstGeom>
+          <a:ln>
+            <a:solidFill>
+              <a:schemeClr val="bg1"/>
+            </a:solidFill>
+          </a:ln>
+        </p:spPr>
+        <p:style>
+          <a:lnRef idx="2">
+            <a:schemeClr val="accent6"/>
+          </a:lnRef>
+          <a:fillRef idx="1">
+            <a:schemeClr val="lt1"/>
+          </a:fillRef>
+          <a:effectRef idx="0">
+            <a:schemeClr val="accent6"/>
+          </a:effectRef>
+          <a:fontRef idx="minor">
+            <a:schemeClr val="dk1"/>
+          </a:fontRef>
+        </p:style>
+        <p:txBody>
+          <a:bodyPr rtlCol="0" anchor="ctr"/>
+          <a:lstStyle/>
+          <a:p>
+            <a:pPr algn="ctr"/>
+            <a:endParaRPr lang="fr-FR"/>
+          </a:p>
+        </p:txBody>
+      </p:sp>
+      <p:sp>
+        <p:nvSpPr>
           <p:cNvPr id="253" name="Google Shape;253;g2fb95174dfe_0_158"/>
           <p:cNvSpPr/>
           <p:nvPr/>
@@ -28434,19 +28993,15 @@
             </a:r>
             <a:r>
               <a:rPr lang="fr-FR" sz="2100" b="1" dirty="0"/>
-              <a:t>motifs and discords in the </a:t>
+              <a:t>motifs and discords to the </a:t>
             </a:r>
             <a:r>
               <a:rPr lang="fr-FR" sz="2100" b="1" dirty="0" err="1"/>
-              <a:t>same</a:t>
+              <a:t>other</a:t>
             </a:r>
             <a:r>
               <a:rPr lang="fr-FR" sz="2100" b="1" dirty="0"/>
-              <a:t> time </a:t>
-            </a:r>
-            <a:r>
-              <a:rPr lang="fr-FR" sz="2100" b="1" dirty="0" err="1"/>
-              <a:t>series</a:t>
+              <a:t> class</a:t>
             </a:r>
             <a:endParaRPr sz="2100" b="0" strike="noStrike" dirty="0">
               <a:solidFill>
@@ -28460,6 +29015,36 @@
           </a:p>
         </p:txBody>
       </p:sp>
+      <p:pic>
+        <p:nvPicPr>
+          <p:cNvPr id="4" name="Image 3" descr="Une image contenant texte, capture d’écran, Tracé, diagramme&#10;&#10;Description générée automatiquement">
+            <a:extLst>
+              <a:ext uri="{FF2B5EF4-FFF2-40B4-BE49-F238E27FC236}">
+                <a16:creationId xmlns:a16="http://schemas.microsoft.com/office/drawing/2014/main" id="{E5D92D4A-8449-4A59-27A4-33761EDE25F3}"/>
+              </a:ext>
+            </a:extLst>
+          </p:cNvPr>
+          <p:cNvPicPr>
+            <a:picLocks noChangeAspect="1"/>
+          </p:cNvPicPr>
+          <p:nvPr/>
+        </p:nvPicPr>
+        <p:blipFill>
+          <a:blip r:embed="rId3"/>
+          <a:stretch>
+            <a:fillRect/>
+          </a:stretch>
+        </p:blipFill>
+        <p:spPr>
+          <a:xfrm>
+            <a:off x="1159328" y="1326091"/>
+            <a:ext cx="6727371" cy="3817409"/>
+          </a:xfrm>
+          <a:prstGeom prst="rect">
+            <a:avLst/>
+          </a:prstGeom>
+        </p:spPr>
+      </p:pic>
     </p:spTree>
     <p:extLst>
       <p:ext uri="{BB962C8B-B14F-4D97-AF65-F5344CB8AC3E}">
@@ -28478,6 +29063,340 @@
   <p:cSld>
     <p:spTree>
       <p:nvGrpSpPr>
+        <p:cNvPr id="1" name="Shape 250"/>
+        <p:cNvGrpSpPr/>
+        <p:nvPr/>
+      </p:nvGrpSpPr>
+      <p:grpSpPr>
+        <a:xfrm>
+          <a:off x="0" y="0"/>
+          <a:ext cx="0" cy="0"/>
+          <a:chOff x="0" y="0"/>
+          <a:chExt cx="0" cy="0"/>
+        </a:xfrm>
+      </p:grpSpPr>
+      <p:sp>
+        <p:nvSpPr>
+          <p:cNvPr id="252" name="Google Shape;252;g2fb95174dfe_0_158"/>
+          <p:cNvSpPr/>
+          <p:nvPr/>
+        </p:nvSpPr>
+        <p:spPr>
+          <a:xfrm>
+            <a:off x="2091450" y="149700"/>
+            <a:ext cx="4961100" cy="622200"/>
+          </a:xfrm>
+          <a:prstGeom prst="rect">
+            <a:avLst/>
+          </a:prstGeom>
+          <a:noFill/>
+          <a:ln>
+            <a:noFill/>
+          </a:ln>
+        </p:spPr>
+        <p:txBody>
+          <a:bodyPr spcFirstLastPara="1" wrap="square" lIns="90000" tIns="45000" rIns="90000" bIns="45000" anchor="t" anchorCtr="0">
+            <a:noAutofit/>
+          </a:bodyPr>
+          <a:lstStyle/>
+          <a:p>
+            <a:pPr marL="0" marR="0" lvl="0" indent="0" algn="ctr" rtl="0">
+              <a:lnSpc>
+                <a:spcPct val="100000"/>
+              </a:lnSpc>
+              <a:spcBef>
+                <a:spcPts val="0"/>
+              </a:spcBef>
+              <a:spcAft>
+                <a:spcPts val="0"/>
+              </a:spcAft>
+              <a:buNone/>
+            </a:pPr>
+            <a:r>
+              <a:rPr lang="fr-FR" sz="3600" b="0" strike="noStrike">
+                <a:solidFill>
+                  <a:srgbClr val="FFFFFF"/>
+                </a:solidFill>
+                <a:latin typeface="Play"/>
+                <a:ea typeface="Play"/>
+                <a:cs typeface="Play"/>
+                <a:sym typeface="Play"/>
+              </a:rPr>
+              <a:t>Series Search</a:t>
+            </a:r>
+            <a:endParaRPr sz="3600" b="0" strike="noStrike">
+              <a:solidFill>
+                <a:srgbClr val="000000"/>
+              </a:solidFill>
+              <a:latin typeface="Arial"/>
+              <a:ea typeface="Arial"/>
+              <a:cs typeface="Arial"/>
+              <a:sym typeface="Arial"/>
+            </a:endParaRPr>
+          </a:p>
+        </p:txBody>
+      </p:sp>
+      <p:sp>
+        <p:nvSpPr>
+          <p:cNvPr id="253" name="Google Shape;253;g2fb95174dfe_0_158"/>
+          <p:cNvSpPr/>
+          <p:nvPr/>
+        </p:nvSpPr>
+        <p:spPr>
+          <a:xfrm>
+            <a:off x="7818120" y="216000"/>
+            <a:ext cx="1325400" cy="489600"/>
+          </a:xfrm>
+          <a:prstGeom prst="rect">
+            <a:avLst/>
+          </a:prstGeom>
+          <a:noFill/>
+          <a:ln>
+            <a:noFill/>
+          </a:ln>
+        </p:spPr>
+        <p:txBody>
+          <a:bodyPr spcFirstLastPara="1" wrap="square" lIns="90000" tIns="45000" rIns="90000" bIns="45000" anchor="t" anchorCtr="0">
+            <a:noAutofit/>
+          </a:bodyPr>
+          <a:lstStyle/>
+          <a:p>
+            <a:pPr marL="0" marR="0" lvl="0" indent="0" algn="l" rtl="0">
+              <a:lnSpc>
+                <a:spcPct val="100000"/>
+              </a:lnSpc>
+              <a:spcBef>
+                <a:spcPts val="0"/>
+              </a:spcBef>
+              <a:spcAft>
+                <a:spcPts val="0"/>
+              </a:spcAft>
+              <a:buNone/>
+            </a:pPr>
+            <a:r>
+              <a:rPr lang="fr-FR" sz="1400" b="0" strike="noStrike">
+                <a:solidFill>
+                  <a:srgbClr val="FFFFFF"/>
+                </a:solidFill>
+                <a:latin typeface="Arial"/>
+                <a:ea typeface="Arial"/>
+                <a:cs typeface="Arial"/>
+                <a:sym typeface="Arial"/>
+              </a:rPr>
+              <a:t>ECML/PKDD 2024 Tutorial</a:t>
+            </a:r>
+            <a:endParaRPr sz="1400" b="0" strike="noStrike">
+              <a:solidFill>
+                <a:srgbClr val="000000"/>
+              </a:solidFill>
+              <a:latin typeface="Arial"/>
+              <a:ea typeface="Arial"/>
+              <a:cs typeface="Arial"/>
+              <a:sym typeface="Arial"/>
+            </a:endParaRPr>
+          </a:p>
+        </p:txBody>
+      </p:sp>
+      <p:sp>
+        <p:nvSpPr>
+          <p:cNvPr id="6" name="Rectangle 5">
+            <a:extLst>
+              <a:ext uri="{FF2B5EF4-FFF2-40B4-BE49-F238E27FC236}">
+                <a16:creationId xmlns:a16="http://schemas.microsoft.com/office/drawing/2014/main" id="{E0E079F0-C6EF-2134-C10B-7FDE911F396A}"/>
+              </a:ext>
+            </a:extLst>
+          </p:cNvPr>
+          <p:cNvSpPr/>
+          <p:nvPr/>
+        </p:nvSpPr>
+        <p:spPr>
+          <a:xfrm>
+            <a:off x="6792685" y="4931229"/>
+            <a:ext cx="2359479" cy="204107"/>
+          </a:xfrm>
+          <a:prstGeom prst="rect">
+            <a:avLst/>
+          </a:prstGeom>
+          <a:ln>
+            <a:solidFill>
+              <a:schemeClr val="bg1"/>
+            </a:solidFill>
+          </a:ln>
+        </p:spPr>
+        <p:style>
+          <a:lnRef idx="2">
+            <a:schemeClr val="accent6"/>
+          </a:lnRef>
+          <a:fillRef idx="1">
+            <a:schemeClr val="lt1"/>
+          </a:fillRef>
+          <a:effectRef idx="0">
+            <a:schemeClr val="accent6"/>
+          </a:effectRef>
+          <a:fontRef idx="minor">
+            <a:schemeClr val="dk1"/>
+          </a:fontRef>
+        </p:style>
+        <p:txBody>
+          <a:bodyPr rtlCol="0" anchor="ctr"/>
+          <a:lstStyle/>
+          <a:p>
+            <a:pPr algn="ctr"/>
+            <a:endParaRPr lang="fr-FR"/>
+          </a:p>
+        </p:txBody>
+      </p:sp>
+      <p:sp>
+        <p:nvSpPr>
+          <p:cNvPr id="2" name="Google Shape;187;g2fb95174dfe_0_114">
+            <a:extLst>
+              <a:ext uri="{FF2B5EF4-FFF2-40B4-BE49-F238E27FC236}">
+                <a16:creationId xmlns:a16="http://schemas.microsoft.com/office/drawing/2014/main" id="{B8B6930E-D4AE-9907-9056-2104820295BC}"/>
+              </a:ext>
+            </a:extLst>
+          </p:cNvPr>
+          <p:cNvSpPr/>
+          <p:nvPr/>
+        </p:nvSpPr>
+        <p:spPr>
+          <a:xfrm>
+            <a:off x="252000" y="933043"/>
+            <a:ext cx="8604000" cy="360000"/>
+          </a:xfrm>
+          <a:prstGeom prst="rect">
+            <a:avLst/>
+          </a:prstGeom>
+          <a:solidFill>
+            <a:srgbClr val="F2CDED"/>
+          </a:solidFill>
+          <a:ln w="10075" cap="flat" cmpd="sng">
+            <a:solidFill>
+              <a:srgbClr val="000000"/>
+            </a:solidFill>
+            <a:prstDash val="solid"/>
+            <a:round/>
+            <a:headEnd type="none" w="sm" len="sm"/>
+            <a:tailEnd type="none" w="sm" len="sm"/>
+          </a:ln>
+        </p:spPr>
+        <p:txBody>
+          <a:bodyPr spcFirstLastPara="1" wrap="square" lIns="54350" tIns="20150" rIns="54350" bIns="20150" anchor="ctr" anchorCtr="0">
+            <a:noAutofit/>
+          </a:bodyPr>
+          <a:lstStyle/>
+          <a:p>
+            <a:pPr marL="0" marR="0" lvl="0" indent="0" algn="ctr" rtl="0">
+              <a:lnSpc>
+                <a:spcPct val="90000"/>
+              </a:lnSpc>
+              <a:spcBef>
+                <a:spcPts val="0"/>
+              </a:spcBef>
+              <a:spcAft>
+                <a:spcPts val="0"/>
+              </a:spcAft>
+              <a:buNone/>
+            </a:pPr>
+            <a:r>
+              <a:rPr lang="fr-FR" sz="2100" b="1" strike="noStrike" dirty="0">
+                <a:solidFill>
+                  <a:srgbClr val="000000"/>
+                </a:solidFill>
+                <a:latin typeface="Arial"/>
+                <a:ea typeface="Arial"/>
+                <a:cs typeface="Arial"/>
+                <a:sym typeface="Arial"/>
+              </a:rPr>
+              <a:t>Case </a:t>
+            </a:r>
+            <a:r>
+              <a:rPr lang="fr-FR" sz="2100" b="1" dirty="0"/>
+              <a:t>3</a:t>
+            </a:r>
+            <a:r>
+              <a:rPr lang="fr-FR" sz="2100" b="1" strike="noStrike" dirty="0">
+                <a:solidFill>
+                  <a:srgbClr val="000000"/>
+                </a:solidFill>
+                <a:latin typeface="Arial"/>
+                <a:ea typeface="Arial"/>
+                <a:cs typeface="Arial"/>
+                <a:sym typeface="Arial"/>
+              </a:rPr>
+              <a:t> : </a:t>
+            </a:r>
+            <a:r>
+              <a:rPr lang="fr-FR" sz="2100" b="1" dirty="0"/>
+              <a:t>motifs and discords to the </a:t>
+            </a:r>
+            <a:r>
+              <a:rPr lang="fr-FR" sz="2100" b="1" dirty="0" err="1"/>
+              <a:t>other</a:t>
+            </a:r>
+            <a:r>
+              <a:rPr lang="fr-FR" sz="2100" b="1" dirty="0"/>
+              <a:t> class</a:t>
+            </a:r>
+            <a:endParaRPr sz="2100" b="0" strike="noStrike" dirty="0">
+              <a:solidFill>
+                <a:srgbClr val="000000"/>
+              </a:solidFill>
+              <a:latin typeface="Arial"/>
+              <a:ea typeface="Arial"/>
+              <a:cs typeface="Arial"/>
+              <a:sym typeface="Arial"/>
+            </a:endParaRPr>
+          </a:p>
+        </p:txBody>
+      </p:sp>
+      <p:pic>
+        <p:nvPicPr>
+          <p:cNvPr id="5" name="Image 4" descr="Une image contenant texte, logiciel, Tracé, ligne&#10;&#10;Description générée automatiquement">
+            <a:extLst>
+              <a:ext uri="{FF2B5EF4-FFF2-40B4-BE49-F238E27FC236}">
+                <a16:creationId xmlns:a16="http://schemas.microsoft.com/office/drawing/2014/main" id="{59477F01-8BCB-285E-1C89-DAC259B66CA0}"/>
+              </a:ext>
+            </a:extLst>
+          </p:cNvPr>
+          <p:cNvPicPr>
+            <a:picLocks noChangeAspect="1"/>
+          </p:cNvPicPr>
+          <p:nvPr/>
+        </p:nvPicPr>
+        <p:blipFill>
+          <a:blip r:embed="rId3"/>
+          <a:stretch>
+            <a:fillRect/>
+          </a:stretch>
+        </p:blipFill>
+        <p:spPr>
+          <a:xfrm>
+            <a:off x="0" y="1404258"/>
+            <a:ext cx="9144000" cy="3543300"/>
+          </a:xfrm>
+          <a:prstGeom prst="rect">
+            <a:avLst/>
+          </a:prstGeom>
+        </p:spPr>
+      </p:pic>
+    </p:spTree>
+    <p:extLst>
+      <p:ext uri="{BB962C8B-B14F-4D97-AF65-F5344CB8AC3E}">
+        <p14:creationId xmlns:p14="http://schemas.microsoft.com/office/powerpoint/2010/main" val="2393294383"/>
+      </p:ext>
+    </p:extLst>
+  </p:cSld>
+  <p:clrMapOvr>
+    <a:masterClrMapping/>
+  </p:clrMapOvr>
+</p:sld>
+</file>
+
+<file path=ppt/slides/slide18.xml><?xml version="1.0" encoding="utf-8"?>
+<p:sld xmlns:a="http://schemas.openxmlformats.org/drawingml/2006/main" xmlns:r="http://schemas.openxmlformats.org/officeDocument/2006/relationships" xmlns:p="http://schemas.openxmlformats.org/presentationml/2006/main">
+  <p:cSld>
+    <p:spTree>
+      <p:nvGrpSpPr>
         <p:cNvPr id="1" name="Shape 275"/>
         <p:cNvGrpSpPr/>
         <p:nvPr/>
@@ -28490,6 +29409,55 @@
           <a:chExt cx="0" cy="0"/>
         </a:xfrm>
       </p:grpSpPr>
+      <p:sp>
+        <p:nvSpPr>
+          <p:cNvPr id="2" name="Rectangle 1">
+            <a:extLst>
+              <a:ext uri="{FF2B5EF4-FFF2-40B4-BE49-F238E27FC236}">
+                <a16:creationId xmlns:a16="http://schemas.microsoft.com/office/drawing/2014/main" id="{8F163FBA-4844-C3FA-2404-057AC2C4AF38}"/>
+              </a:ext>
+            </a:extLst>
+          </p:cNvPr>
+          <p:cNvSpPr/>
+          <p:nvPr/>
+        </p:nvSpPr>
+        <p:spPr>
+          <a:xfrm>
+            <a:off x="6792685" y="4931229"/>
+            <a:ext cx="2359479" cy="204107"/>
+          </a:xfrm>
+          <a:prstGeom prst="rect">
+            <a:avLst/>
+          </a:prstGeom>
+          <a:ln>
+            <a:solidFill>
+              <a:schemeClr val="bg1"/>
+            </a:solidFill>
+          </a:ln>
+        </p:spPr>
+        <p:style>
+          <a:lnRef idx="2">
+            <a:schemeClr val="accent6"/>
+          </a:lnRef>
+          <a:fillRef idx="1">
+            <a:schemeClr val="lt1"/>
+          </a:fillRef>
+          <a:effectRef idx="0">
+            <a:schemeClr val="accent6"/>
+          </a:effectRef>
+          <a:fontRef idx="minor">
+            <a:schemeClr val="dk1"/>
+          </a:fontRef>
+        </p:style>
+        <p:txBody>
+          <a:bodyPr rtlCol="0" anchor="ctr"/>
+          <a:lstStyle/>
+          <a:p>
+            <a:pPr algn="ctr"/>
+            <a:endParaRPr lang="fr-FR"/>
+          </a:p>
+        </p:txBody>
+      </p:sp>
       <p:sp>
         <p:nvSpPr>
           <p:cNvPr id="276" name="Google Shape;276;g2fb95174dfe_0_69"/>
@@ -29989,7 +30957,7 @@
 </p:sld>
 </file>
 
-<file path=ppt/slides/slide18.xml><?xml version="1.0" encoding="utf-8"?>
+<file path=ppt/slides/slide19.xml><?xml version="1.0" encoding="utf-8"?>
 <p:sld xmlns:a="http://schemas.openxmlformats.org/drawingml/2006/main" xmlns:r="http://schemas.openxmlformats.org/officeDocument/2006/relationships" xmlns:p="http://schemas.openxmlformats.org/presentationml/2006/main">
   <p:cSld>
     <p:spTree>
@@ -30282,758 +31250,52 @@
           </a:p>
         </p:txBody>
       </p:sp>
-    </p:spTree>
-  </p:cSld>
-  <p:clrMapOvr>
-    <a:masterClrMapping/>
-  </p:clrMapOvr>
-</p:sld>
-</file>
-
-<file path=ppt/slides/slide19.xml><?xml version="1.0" encoding="utf-8"?>
-<p:sld xmlns:a="http://schemas.openxmlformats.org/drawingml/2006/main" xmlns:r="http://schemas.openxmlformats.org/officeDocument/2006/relationships" xmlns:p="http://schemas.openxmlformats.org/presentationml/2006/main">
-  <p:cSld>
-    <p:spTree>
-      <p:nvGrpSpPr>
-        <p:cNvPr id="1" name="Shape 293"/>
-        <p:cNvGrpSpPr/>
-        <p:nvPr/>
-      </p:nvGrpSpPr>
-      <p:grpSpPr>
-        <a:xfrm>
-          <a:off x="0" y="0"/>
-          <a:ext cx="0" cy="0"/>
-          <a:chOff x="0" y="0"/>
-          <a:chExt cx="0" cy="0"/>
-        </a:xfrm>
-      </p:grpSpPr>
       <p:sp>
         <p:nvSpPr>
-          <p:cNvPr id="294" name="Google Shape;294;g2fb95174dfe_0_247"/>
+          <p:cNvPr id="2" name="Rectangle 1">
+            <a:extLst>
+              <a:ext uri="{FF2B5EF4-FFF2-40B4-BE49-F238E27FC236}">
+                <a16:creationId xmlns:a16="http://schemas.microsoft.com/office/drawing/2014/main" id="{066B0AE6-A239-FA46-D1A4-F1CF74959259}"/>
+              </a:ext>
+            </a:extLst>
+          </p:cNvPr>
           <p:cNvSpPr/>
           <p:nvPr/>
         </p:nvSpPr>
         <p:spPr>
           <a:xfrm>
-            <a:off x="972000" y="144000"/>
-            <a:ext cx="7199700" cy="1154100"/>
+            <a:off x="6792685" y="4931229"/>
+            <a:ext cx="2359479" cy="204107"/>
           </a:xfrm>
           <a:prstGeom prst="rect">
             <a:avLst/>
           </a:prstGeom>
-          <a:noFill/>
           <a:ln>
-            <a:noFill/>
+            <a:solidFill>
+              <a:schemeClr val="bg1"/>
+            </a:solidFill>
           </a:ln>
         </p:spPr>
+        <p:style>
+          <a:lnRef idx="2">
+            <a:schemeClr val="accent6"/>
+          </a:lnRef>
+          <a:fillRef idx="1">
+            <a:schemeClr val="lt1"/>
+          </a:fillRef>
+          <a:effectRef idx="0">
+            <a:schemeClr val="accent6"/>
+          </a:effectRef>
+          <a:fontRef idx="minor">
+            <a:schemeClr val="dk1"/>
+          </a:fontRef>
+        </p:style>
         <p:txBody>
-          <a:bodyPr spcFirstLastPara="1" wrap="square" lIns="90000" tIns="45000" rIns="90000" bIns="45000" anchor="t" anchorCtr="0">
-            <a:noAutofit/>
-          </a:bodyPr>
+          <a:bodyPr rtlCol="0" anchor="ctr"/>
           <a:lstStyle/>
           <a:p>
-            <a:pPr marL="0" marR="0" lvl="0" indent="0" algn="ctr" rtl="0">
-              <a:lnSpc>
-                <a:spcPct val="100000"/>
-              </a:lnSpc>
-              <a:spcBef>
-                <a:spcPts val="0"/>
-              </a:spcBef>
-              <a:spcAft>
-                <a:spcPts val="0"/>
-              </a:spcAft>
-              <a:buNone/>
-            </a:pPr>
-            <a:r>
-              <a:rPr lang="fr-FR" sz="3600" b="0" strike="noStrike">
-                <a:solidFill>
-                  <a:srgbClr val="FFFFFF"/>
-                </a:solidFill>
-                <a:latin typeface="Play"/>
-                <a:ea typeface="Play"/>
-                <a:cs typeface="Play"/>
-                <a:sym typeface="Play"/>
-              </a:rPr>
-              <a:t>Series Search : </a:t>
-            </a:r>
-            <a:r>
-              <a:rPr lang="fr-FR" sz="3600">
-                <a:solidFill>
-                  <a:srgbClr val="FFFFFF"/>
-                </a:solidFill>
-                <a:latin typeface="Play"/>
-                <a:ea typeface="Play"/>
-                <a:cs typeface="Play"/>
-                <a:sym typeface="Play"/>
-              </a:rPr>
-              <a:t>Future plan</a:t>
-            </a:r>
-            <a:endParaRPr sz="3600" b="0" strike="noStrike">
-              <a:solidFill>
-                <a:srgbClr val="000000"/>
-              </a:solidFill>
-              <a:latin typeface="Arial"/>
-              <a:ea typeface="Arial"/>
-              <a:cs typeface="Arial"/>
-              <a:sym typeface="Arial"/>
-            </a:endParaRPr>
-          </a:p>
-        </p:txBody>
-      </p:sp>
-      <p:sp>
-        <p:nvSpPr>
-          <p:cNvPr id="295" name="Google Shape;295;g2fb95174dfe_0_247"/>
-          <p:cNvSpPr/>
-          <p:nvPr/>
-        </p:nvSpPr>
-        <p:spPr>
-          <a:xfrm>
-            <a:off x="7818120" y="216000"/>
-            <a:ext cx="1325400" cy="489600"/>
-          </a:xfrm>
-          <a:prstGeom prst="rect">
-            <a:avLst/>
-          </a:prstGeom>
-          <a:noFill/>
-          <a:ln>
-            <a:noFill/>
-          </a:ln>
-        </p:spPr>
-        <p:txBody>
-          <a:bodyPr spcFirstLastPara="1" wrap="square" lIns="90000" tIns="45000" rIns="90000" bIns="45000" anchor="t" anchorCtr="0">
-            <a:noAutofit/>
-          </a:bodyPr>
-          <a:lstStyle/>
-          <a:p>
-            <a:pPr marL="0" marR="0" lvl="0" indent="0" algn="l" rtl="0">
-              <a:lnSpc>
-                <a:spcPct val="100000"/>
-              </a:lnSpc>
-              <a:spcBef>
-                <a:spcPts val="0"/>
-              </a:spcBef>
-              <a:spcAft>
-                <a:spcPts val="0"/>
-              </a:spcAft>
-              <a:buNone/>
-            </a:pPr>
-            <a:r>
-              <a:rPr lang="fr-FR" sz="1400" b="0" strike="noStrike">
-                <a:solidFill>
-                  <a:srgbClr val="FFFFFF"/>
-                </a:solidFill>
-                <a:latin typeface="Arial"/>
-                <a:ea typeface="Arial"/>
-                <a:cs typeface="Arial"/>
-                <a:sym typeface="Arial"/>
-              </a:rPr>
-              <a:t>ECML/PKDD 2024 Tutorial</a:t>
-            </a:r>
-            <a:endParaRPr sz="1400" b="0" strike="noStrike">
-              <a:solidFill>
-                <a:srgbClr val="000000"/>
-              </a:solidFill>
-              <a:latin typeface="Arial"/>
-              <a:ea typeface="Arial"/>
-              <a:cs typeface="Arial"/>
-              <a:sym typeface="Arial"/>
-            </a:endParaRPr>
-          </a:p>
-        </p:txBody>
-      </p:sp>
-      <p:sp>
-        <p:nvSpPr>
-          <p:cNvPr id="296" name="Google Shape;296;g2fb95174dfe_0_247"/>
-          <p:cNvSpPr/>
-          <p:nvPr/>
-        </p:nvSpPr>
-        <p:spPr>
-          <a:xfrm>
-            <a:off x="4715300" y="1540175"/>
-            <a:ext cx="4192800" cy="2894400"/>
-          </a:xfrm>
-          <a:prstGeom prst="rect">
-            <a:avLst/>
-          </a:prstGeom>
-          <a:solidFill>
-            <a:srgbClr val="F2CDED"/>
-          </a:solidFill>
-          <a:ln w="10075" cap="flat" cmpd="sng">
-            <a:solidFill>
-              <a:srgbClr val="000000"/>
-            </a:solidFill>
-            <a:prstDash val="solid"/>
-            <a:round/>
-            <a:headEnd type="none" w="sm" len="sm"/>
-            <a:tailEnd type="none" w="sm" len="sm"/>
-          </a:ln>
-        </p:spPr>
-        <p:txBody>
-          <a:bodyPr spcFirstLastPara="1" wrap="square" lIns="54350" tIns="20150" rIns="54350" bIns="20150" anchor="t" anchorCtr="0">
-            <a:noAutofit/>
-          </a:bodyPr>
-          <a:lstStyle/>
-          <a:p>
-            <a:pPr marL="0" marR="0" lvl="0" indent="0" algn="l" rtl="0">
-              <a:lnSpc>
-                <a:spcPct val="90000"/>
-              </a:lnSpc>
-              <a:spcBef>
-                <a:spcPts val="0"/>
-              </a:spcBef>
-              <a:spcAft>
-                <a:spcPts val="0"/>
-              </a:spcAft>
-              <a:buNone/>
-            </a:pPr>
-            <a:r>
-              <a:rPr lang="fr-FR" sz="2100" b="1" u="sng" dirty="0" err="1"/>
-              <a:t>Planned</a:t>
-            </a:r>
-            <a:r>
-              <a:rPr lang="fr-FR" sz="2100" b="1" u="sng" dirty="0"/>
-              <a:t> </a:t>
-            </a:r>
-            <a:r>
-              <a:rPr lang="fr-FR" sz="2100" b="1" u="sng" dirty="0" err="1"/>
-              <a:t>implementations</a:t>
-            </a:r>
-            <a:r>
-              <a:rPr lang="fr-FR" sz="2100" dirty="0"/>
-              <a:t>:</a:t>
-            </a:r>
-            <a:endParaRPr sz="2100" dirty="0"/>
-          </a:p>
-          <a:p>
-            <a:pPr marL="0" marR="0" lvl="0" indent="0" algn="l" rtl="0">
-              <a:lnSpc>
-                <a:spcPct val="90000"/>
-              </a:lnSpc>
-              <a:spcBef>
-                <a:spcPts val="0"/>
-              </a:spcBef>
-              <a:spcAft>
-                <a:spcPts val="0"/>
-              </a:spcAft>
-              <a:buNone/>
-            </a:pPr>
-            <a:endParaRPr sz="2100" dirty="0"/>
-          </a:p>
-          <a:p>
-            <a:pPr marL="457200" marR="0" lvl="0" indent="-342900" algn="l" rtl="0">
-              <a:lnSpc>
-                <a:spcPct val="90000"/>
-              </a:lnSpc>
-              <a:spcBef>
-                <a:spcPts val="0"/>
-              </a:spcBef>
-              <a:spcAft>
-                <a:spcPts val="0"/>
-              </a:spcAft>
-              <a:buClr>
-                <a:schemeClr val="dk1"/>
-              </a:buClr>
-              <a:buSzPts val="1800"/>
-              <a:buChar char="➢"/>
-            </a:pPr>
-            <a:r>
-              <a:rPr lang="fr-FR" sz="2100" dirty="0">
-                <a:solidFill>
-                  <a:schemeClr val="dk1"/>
-                </a:solidFill>
-              </a:rPr>
-              <a:t>The diverse matrix profile </a:t>
-            </a:r>
-            <a:r>
-              <a:rPr lang="fr-FR" sz="2100" dirty="0" err="1">
-                <a:solidFill>
-                  <a:schemeClr val="dk1"/>
-                </a:solidFill>
-              </a:rPr>
-              <a:t>implementations</a:t>
-            </a:r>
-            <a:r>
-              <a:rPr lang="fr-FR" sz="2100" dirty="0">
-                <a:solidFill>
-                  <a:schemeClr val="dk1"/>
-                </a:solidFill>
-              </a:rPr>
-              <a:t> for </a:t>
-            </a:r>
-            <a:r>
-              <a:rPr lang="fr-FR" sz="2100" dirty="0" err="1">
-                <a:solidFill>
-                  <a:schemeClr val="dk1"/>
-                </a:solidFill>
-              </a:rPr>
-              <a:t>Euclidean</a:t>
-            </a:r>
-            <a:r>
-              <a:rPr lang="fr-FR" sz="2100" dirty="0">
-                <a:solidFill>
-                  <a:schemeClr val="dk1"/>
-                </a:solidFill>
-              </a:rPr>
-              <a:t> and DTW [4] </a:t>
-            </a:r>
-          </a:p>
-          <a:p>
-            <a:pPr marL="114300" marR="0" lvl="0" algn="l" rtl="0">
-              <a:lnSpc>
-                <a:spcPct val="90000"/>
-              </a:lnSpc>
-              <a:spcBef>
-                <a:spcPts val="0"/>
-              </a:spcBef>
-              <a:spcAft>
-                <a:spcPts val="0"/>
-              </a:spcAft>
-              <a:buClr>
-                <a:schemeClr val="dk1"/>
-              </a:buClr>
-              <a:buSzPts val="1800"/>
-            </a:pPr>
-            <a:endParaRPr sz="2100" dirty="0">
-              <a:solidFill>
-                <a:schemeClr val="dk1"/>
-              </a:solidFill>
-            </a:endParaRPr>
-          </a:p>
-          <a:p>
-            <a:pPr marL="457200" marR="0" lvl="0" indent="-342900" algn="l" rtl="0">
-              <a:lnSpc>
-                <a:spcPct val="90000"/>
-              </a:lnSpc>
-              <a:spcBef>
-                <a:spcPts val="0"/>
-              </a:spcBef>
-              <a:spcAft>
-                <a:spcPts val="0"/>
-              </a:spcAft>
-              <a:buClr>
-                <a:schemeClr val="dk1"/>
-              </a:buClr>
-              <a:buSzPts val="1800"/>
-              <a:buChar char="➢"/>
-            </a:pPr>
-            <a:r>
-              <a:rPr lang="fr-FR" sz="2100" dirty="0" err="1">
-                <a:solidFill>
-                  <a:schemeClr val="dk1"/>
-                </a:solidFill>
-              </a:rPr>
-              <a:t>Attempt</a:t>
-            </a:r>
-            <a:r>
-              <a:rPr lang="fr-FR" sz="2100" dirty="0">
-                <a:solidFill>
-                  <a:schemeClr val="dk1"/>
-                </a:solidFill>
-              </a:rPr>
-              <a:t> to </a:t>
-            </a:r>
-            <a:r>
-              <a:rPr lang="fr-FR" sz="2100" dirty="0" err="1">
-                <a:solidFill>
-                  <a:schemeClr val="dk1"/>
-                </a:solidFill>
-              </a:rPr>
-              <a:t>generalize</a:t>
-            </a:r>
-            <a:r>
-              <a:rPr lang="fr-FR" sz="2100" dirty="0">
-                <a:solidFill>
-                  <a:schemeClr val="dk1"/>
-                </a:solidFill>
-              </a:rPr>
-              <a:t> </a:t>
-            </a:r>
-            <a:r>
-              <a:rPr lang="fr-FR" sz="2100" dirty="0" err="1">
-                <a:solidFill>
-                  <a:schemeClr val="dk1"/>
-                </a:solidFill>
-              </a:rPr>
-              <a:t>their</a:t>
-            </a:r>
-            <a:r>
-              <a:rPr lang="fr-FR" sz="2100" dirty="0">
-                <a:solidFill>
-                  <a:schemeClr val="dk1"/>
-                </a:solidFill>
-              </a:rPr>
-              <a:t> DTW </a:t>
-            </a:r>
-            <a:r>
-              <a:rPr lang="fr-FR" sz="2100" dirty="0" err="1">
-                <a:solidFill>
-                  <a:schemeClr val="dk1"/>
-                </a:solidFill>
-              </a:rPr>
-              <a:t>approach</a:t>
-            </a:r>
-            <a:r>
-              <a:rPr lang="fr-FR" sz="2100" dirty="0">
-                <a:solidFill>
-                  <a:schemeClr val="dk1"/>
-                </a:solidFill>
-              </a:rPr>
-              <a:t> to </a:t>
-            </a:r>
-            <a:r>
-              <a:rPr lang="fr-FR" sz="2100" dirty="0" err="1">
-                <a:solidFill>
-                  <a:schemeClr val="dk1"/>
-                </a:solidFill>
-              </a:rPr>
-              <a:t>other</a:t>
-            </a:r>
-            <a:r>
-              <a:rPr lang="fr-FR" sz="2100" dirty="0">
-                <a:solidFill>
-                  <a:schemeClr val="dk1"/>
-                </a:solidFill>
-              </a:rPr>
-              <a:t> </a:t>
-            </a:r>
-            <a:r>
-              <a:rPr lang="fr-FR" sz="2100" dirty="0" err="1">
-                <a:solidFill>
-                  <a:schemeClr val="dk1"/>
-                </a:solidFill>
-              </a:rPr>
-              <a:t>elastic</a:t>
-            </a:r>
-            <a:r>
-              <a:rPr lang="fr-FR" sz="2100" dirty="0">
-                <a:solidFill>
-                  <a:schemeClr val="dk1"/>
-                </a:solidFill>
-              </a:rPr>
-              <a:t> distances</a:t>
-            </a:r>
-            <a:br>
-              <a:rPr lang="fr-FR" sz="2100" dirty="0">
-                <a:solidFill>
-                  <a:schemeClr val="dk1"/>
-                </a:solidFill>
-              </a:rPr>
-            </a:br>
-            <a:endParaRPr sz="2100" dirty="0">
-              <a:solidFill>
-                <a:schemeClr val="dk1"/>
-              </a:solidFill>
-            </a:endParaRPr>
-          </a:p>
-          <a:p>
-            <a:pPr marL="0" marR="0" lvl="0" indent="0" algn="l" rtl="0">
-              <a:lnSpc>
-                <a:spcPct val="90000"/>
-              </a:lnSpc>
-              <a:spcBef>
-                <a:spcPts val="0"/>
-              </a:spcBef>
-              <a:spcAft>
-                <a:spcPts val="0"/>
-              </a:spcAft>
-              <a:buNone/>
-            </a:pPr>
-            <a:endParaRPr sz="2100" dirty="0">
-              <a:solidFill>
-                <a:schemeClr val="dk1"/>
-              </a:solidFill>
-            </a:endParaRPr>
-          </a:p>
-          <a:p>
-            <a:pPr marL="457200" marR="0" lvl="0" indent="0" algn="l" rtl="0">
-              <a:lnSpc>
-                <a:spcPct val="90000"/>
-              </a:lnSpc>
-              <a:spcBef>
-                <a:spcPts val="0"/>
-              </a:spcBef>
-              <a:spcAft>
-                <a:spcPts val="0"/>
-              </a:spcAft>
-              <a:buNone/>
-            </a:pPr>
-            <a:endParaRPr sz="2100" dirty="0"/>
-          </a:p>
-          <a:p>
-            <a:pPr marL="0" marR="0" lvl="0" indent="0" algn="l" rtl="0">
-              <a:lnSpc>
-                <a:spcPct val="90000"/>
-              </a:lnSpc>
-              <a:spcBef>
-                <a:spcPts val="0"/>
-              </a:spcBef>
-              <a:spcAft>
-                <a:spcPts val="0"/>
-              </a:spcAft>
-              <a:buNone/>
-            </a:pPr>
-            <a:endParaRPr sz="2100" b="0" strike="noStrike" dirty="0">
-              <a:solidFill>
-                <a:srgbClr val="000000"/>
-              </a:solidFill>
-              <a:latin typeface="Arial"/>
-              <a:ea typeface="Arial"/>
-              <a:cs typeface="Arial"/>
-              <a:sym typeface="Arial"/>
-            </a:endParaRPr>
-          </a:p>
-        </p:txBody>
-      </p:sp>
-      <p:sp>
-        <p:nvSpPr>
-          <p:cNvPr id="297" name="Google Shape;297;g2fb95174dfe_0_247"/>
-          <p:cNvSpPr/>
-          <p:nvPr/>
-        </p:nvSpPr>
-        <p:spPr>
-          <a:xfrm>
-            <a:off x="146957" y="1951264"/>
-            <a:ext cx="4401593" cy="1934161"/>
-          </a:xfrm>
-          <a:prstGeom prst="rect">
-            <a:avLst/>
-          </a:prstGeom>
-          <a:solidFill>
-            <a:srgbClr val="F2CDED"/>
-          </a:solidFill>
-          <a:ln w="10075" cap="flat" cmpd="sng">
-            <a:solidFill>
-              <a:srgbClr val="000000"/>
-            </a:solidFill>
-            <a:prstDash val="solid"/>
-            <a:round/>
-            <a:headEnd type="none" w="sm" len="sm"/>
-            <a:tailEnd type="none" w="sm" len="sm"/>
-          </a:ln>
-        </p:spPr>
-        <p:txBody>
-          <a:bodyPr spcFirstLastPara="1" wrap="square" lIns="54350" tIns="20150" rIns="54350" bIns="20150" anchor="t" anchorCtr="0">
-            <a:noAutofit/>
-          </a:bodyPr>
-          <a:lstStyle/>
-          <a:p>
-            <a:pPr marL="0" lvl="0" indent="0" algn="l" rtl="0">
-              <a:lnSpc>
-                <a:spcPct val="90000"/>
-              </a:lnSpc>
-              <a:spcBef>
-                <a:spcPts val="0"/>
-              </a:spcBef>
-              <a:spcAft>
-                <a:spcPts val="0"/>
-              </a:spcAft>
-              <a:buNone/>
-            </a:pPr>
-            <a:r>
-              <a:rPr lang="fr-FR" sz="2100" b="1" u="sng" dirty="0">
-                <a:solidFill>
-                  <a:schemeClr val="dk1"/>
-                </a:solidFill>
-              </a:rPr>
-              <a:t>STOMP optimisations and </a:t>
-            </a:r>
-            <a:r>
-              <a:rPr lang="fr-FR" sz="2100" b="1" u="sng" dirty="0" err="1">
-                <a:solidFill>
-                  <a:schemeClr val="dk1"/>
-                </a:solidFill>
-              </a:rPr>
-              <a:t>refactoring</a:t>
-            </a:r>
-            <a:endParaRPr sz="2100" b="1" u="sng" dirty="0">
-              <a:solidFill>
-                <a:schemeClr val="dk1"/>
-              </a:solidFill>
-            </a:endParaRPr>
-          </a:p>
-          <a:p>
-            <a:pPr marL="0" lvl="0" indent="0" algn="l" rtl="0">
-              <a:lnSpc>
-                <a:spcPct val="90000"/>
-              </a:lnSpc>
-              <a:spcBef>
-                <a:spcPts val="0"/>
-              </a:spcBef>
-              <a:spcAft>
-                <a:spcPts val="0"/>
-              </a:spcAft>
-              <a:buNone/>
-            </a:pPr>
-            <a:endParaRPr sz="2100" dirty="0">
-              <a:solidFill>
-                <a:schemeClr val="dk1"/>
-              </a:solidFill>
-            </a:endParaRPr>
-          </a:p>
-          <a:p>
-            <a:pPr marL="457200" lvl="0" indent="-361950" algn="l" rtl="0">
-              <a:lnSpc>
-                <a:spcPct val="90000"/>
-              </a:lnSpc>
-              <a:spcBef>
-                <a:spcPts val="0"/>
-              </a:spcBef>
-              <a:spcAft>
-                <a:spcPts val="0"/>
-              </a:spcAft>
-              <a:buClr>
-                <a:schemeClr val="dk1"/>
-              </a:buClr>
-              <a:buSzPts val="2100"/>
-              <a:buChar char="➢"/>
-            </a:pPr>
-            <a:r>
-              <a:rPr lang="fr-FR" sz="2100" dirty="0">
-                <a:solidFill>
-                  <a:schemeClr val="dk1"/>
-                </a:solidFill>
-              </a:rPr>
-              <a:t>The </a:t>
-            </a:r>
-            <a:r>
-              <a:rPr lang="fr-FR" sz="2100" dirty="0" err="1">
-                <a:solidFill>
-                  <a:schemeClr val="dk1"/>
-                </a:solidFill>
-              </a:rPr>
-              <a:t>current</a:t>
-            </a:r>
-            <a:r>
-              <a:rPr lang="fr-FR" sz="2100" dirty="0">
-                <a:solidFill>
-                  <a:schemeClr val="dk1"/>
-                </a:solidFill>
-              </a:rPr>
-              <a:t> </a:t>
-            </a:r>
-            <a:r>
-              <a:rPr lang="en-GB" sz="2100" dirty="0">
-                <a:solidFill>
-                  <a:schemeClr val="dk1"/>
-                </a:solidFill>
-              </a:rPr>
-              <a:t>implementation</a:t>
-            </a:r>
-            <a:r>
-              <a:rPr lang="fr-FR" sz="2100" dirty="0">
-                <a:solidFill>
-                  <a:schemeClr val="dk1"/>
-                </a:solidFill>
-              </a:rPr>
-              <a:t> </a:t>
-            </a:r>
-            <a:r>
-              <a:rPr lang="fr-FR" sz="2100" dirty="0" err="1">
-                <a:solidFill>
-                  <a:schemeClr val="dk1"/>
-                </a:solidFill>
-              </a:rPr>
-              <a:t>is</a:t>
-            </a:r>
-            <a:r>
-              <a:rPr lang="fr-FR" sz="2100" dirty="0">
-                <a:solidFill>
-                  <a:schemeClr val="dk1"/>
-                </a:solidFill>
-              </a:rPr>
-              <a:t> a bit </a:t>
-            </a:r>
-            <a:r>
-              <a:rPr lang="fr-FR" sz="2100" dirty="0" err="1">
-                <a:solidFill>
-                  <a:schemeClr val="dk1"/>
-                </a:solidFill>
-              </a:rPr>
-              <a:t>messy</a:t>
-            </a:r>
-            <a:r>
-              <a:rPr lang="fr-FR" sz="2100" dirty="0">
-                <a:solidFill>
-                  <a:schemeClr val="dk1"/>
-                </a:solidFill>
-              </a:rPr>
-              <a:t>, and </a:t>
-            </a:r>
-            <a:r>
-              <a:rPr lang="fr-FR" sz="2100" dirty="0" err="1">
-                <a:solidFill>
-                  <a:schemeClr val="dk1"/>
-                </a:solidFill>
-              </a:rPr>
-              <a:t>could</a:t>
-            </a:r>
-            <a:r>
-              <a:rPr lang="fr-FR" sz="2100" dirty="0">
-                <a:solidFill>
-                  <a:schemeClr val="dk1"/>
-                </a:solidFill>
-              </a:rPr>
-              <a:t> use </a:t>
-            </a:r>
-            <a:r>
-              <a:rPr lang="fr-FR" sz="2100" dirty="0" err="1">
-                <a:solidFill>
-                  <a:schemeClr val="dk1"/>
-                </a:solidFill>
-              </a:rPr>
-              <a:t>some</a:t>
-            </a:r>
-            <a:r>
-              <a:rPr lang="fr-FR" sz="2100" dirty="0">
-                <a:solidFill>
-                  <a:schemeClr val="dk1"/>
-                </a:solidFill>
-              </a:rPr>
-              <a:t> optimisations and </a:t>
-            </a:r>
-            <a:r>
-              <a:rPr lang="fr-FR" sz="2100" dirty="0" err="1">
-                <a:solidFill>
-                  <a:schemeClr val="dk1"/>
-                </a:solidFill>
-              </a:rPr>
-              <a:t>refactoring</a:t>
-            </a:r>
-            <a:endParaRPr sz="2100" dirty="0">
-              <a:solidFill>
-                <a:schemeClr val="dk1"/>
-              </a:solidFill>
-            </a:endParaRPr>
-          </a:p>
-          <a:p>
-            <a:pPr marL="457200" marR="0" lvl="0" indent="0" algn="l" rtl="0">
-              <a:lnSpc>
-                <a:spcPct val="90000"/>
-              </a:lnSpc>
-              <a:spcBef>
-                <a:spcPts val="0"/>
-              </a:spcBef>
-              <a:spcAft>
-                <a:spcPts val="0"/>
-              </a:spcAft>
-              <a:buNone/>
-            </a:pPr>
-            <a:endParaRPr sz="2000" b="1" u="sng" dirty="0"/>
-          </a:p>
-          <a:p>
-            <a:pPr marL="0" marR="0" lvl="0" indent="0" algn="l" rtl="0">
-              <a:lnSpc>
-                <a:spcPct val="90000"/>
-              </a:lnSpc>
-              <a:spcBef>
-                <a:spcPts val="0"/>
-              </a:spcBef>
-              <a:spcAft>
-                <a:spcPts val="0"/>
-              </a:spcAft>
-              <a:buNone/>
-            </a:pPr>
-            <a:endParaRPr sz="2000" b="1" u="sng" dirty="0"/>
+            <a:pPr algn="ctr"/>
+            <a:endParaRPr lang="fr-FR"/>
           </a:p>
         </p:txBody>
       </p:sp>
@@ -32182,6 +32444,55 @@
           </a:ln>
         </p:spPr>
       </p:pic>
+      <p:sp>
+        <p:nvSpPr>
+          <p:cNvPr id="2" name="Rectangle 1">
+            <a:extLst>
+              <a:ext uri="{FF2B5EF4-FFF2-40B4-BE49-F238E27FC236}">
+                <a16:creationId xmlns:a16="http://schemas.microsoft.com/office/drawing/2014/main" id="{1132E4D8-61C7-CD0F-E44E-00DAE9B50AA7}"/>
+              </a:ext>
+            </a:extLst>
+          </p:cNvPr>
+          <p:cNvSpPr/>
+          <p:nvPr/>
+        </p:nvSpPr>
+        <p:spPr>
+          <a:xfrm>
+            <a:off x="6792685" y="4931229"/>
+            <a:ext cx="2359479" cy="204107"/>
+          </a:xfrm>
+          <a:prstGeom prst="rect">
+            <a:avLst/>
+          </a:prstGeom>
+          <a:ln>
+            <a:solidFill>
+              <a:schemeClr val="bg1"/>
+            </a:solidFill>
+          </a:ln>
+        </p:spPr>
+        <p:style>
+          <a:lnRef idx="2">
+            <a:schemeClr val="accent6"/>
+          </a:lnRef>
+          <a:fillRef idx="1">
+            <a:schemeClr val="lt1"/>
+          </a:fillRef>
+          <a:effectRef idx="0">
+            <a:schemeClr val="accent6"/>
+          </a:effectRef>
+          <a:fontRef idx="minor">
+            <a:schemeClr val="dk1"/>
+          </a:fontRef>
+        </p:style>
+        <p:txBody>
+          <a:bodyPr rtlCol="0" anchor="ctr"/>
+          <a:lstStyle/>
+          <a:p>
+            <a:pPr algn="ctr"/>
+            <a:endParaRPr lang="fr-FR"/>
+          </a:p>
+        </p:txBody>
+      </p:sp>
     </p:spTree>
   </p:cSld>
   <p:clrMapOvr>
@@ -32191,6 +32502,810 @@
 </file>
 
 <file path=ppt/slides/slide20.xml><?xml version="1.0" encoding="utf-8"?>
+<p:sld xmlns:a="http://schemas.openxmlformats.org/drawingml/2006/main" xmlns:r="http://schemas.openxmlformats.org/officeDocument/2006/relationships" xmlns:p="http://schemas.openxmlformats.org/presentationml/2006/main">
+  <p:cSld>
+    <p:spTree>
+      <p:nvGrpSpPr>
+        <p:cNvPr id="1" name="Shape 293"/>
+        <p:cNvGrpSpPr/>
+        <p:nvPr/>
+      </p:nvGrpSpPr>
+      <p:grpSpPr>
+        <a:xfrm>
+          <a:off x="0" y="0"/>
+          <a:ext cx="0" cy="0"/>
+          <a:chOff x="0" y="0"/>
+          <a:chExt cx="0" cy="0"/>
+        </a:xfrm>
+      </p:grpSpPr>
+      <p:sp>
+        <p:nvSpPr>
+          <p:cNvPr id="294" name="Google Shape;294;g2fb95174dfe_0_247"/>
+          <p:cNvSpPr/>
+          <p:nvPr/>
+        </p:nvSpPr>
+        <p:spPr>
+          <a:xfrm>
+            <a:off x="972000" y="144000"/>
+            <a:ext cx="7199700" cy="1154100"/>
+          </a:xfrm>
+          <a:prstGeom prst="rect">
+            <a:avLst/>
+          </a:prstGeom>
+          <a:noFill/>
+          <a:ln>
+            <a:noFill/>
+          </a:ln>
+        </p:spPr>
+        <p:txBody>
+          <a:bodyPr spcFirstLastPara="1" wrap="square" lIns="90000" tIns="45000" rIns="90000" bIns="45000" anchor="t" anchorCtr="0">
+            <a:noAutofit/>
+          </a:bodyPr>
+          <a:lstStyle/>
+          <a:p>
+            <a:pPr marL="0" marR="0" lvl="0" indent="0" algn="ctr" rtl="0">
+              <a:lnSpc>
+                <a:spcPct val="100000"/>
+              </a:lnSpc>
+              <a:spcBef>
+                <a:spcPts val="0"/>
+              </a:spcBef>
+              <a:spcAft>
+                <a:spcPts val="0"/>
+              </a:spcAft>
+              <a:buNone/>
+            </a:pPr>
+            <a:r>
+              <a:rPr lang="fr-FR" sz="3600" b="0" strike="noStrike">
+                <a:solidFill>
+                  <a:srgbClr val="FFFFFF"/>
+                </a:solidFill>
+                <a:latin typeface="Play"/>
+                <a:ea typeface="Play"/>
+                <a:cs typeface="Play"/>
+                <a:sym typeface="Play"/>
+              </a:rPr>
+              <a:t>Series Search : </a:t>
+            </a:r>
+            <a:r>
+              <a:rPr lang="fr-FR" sz="3600">
+                <a:solidFill>
+                  <a:srgbClr val="FFFFFF"/>
+                </a:solidFill>
+                <a:latin typeface="Play"/>
+                <a:ea typeface="Play"/>
+                <a:cs typeface="Play"/>
+                <a:sym typeface="Play"/>
+              </a:rPr>
+              <a:t>Future plan</a:t>
+            </a:r>
+            <a:endParaRPr sz="3600" b="0" strike="noStrike">
+              <a:solidFill>
+                <a:srgbClr val="000000"/>
+              </a:solidFill>
+              <a:latin typeface="Arial"/>
+              <a:ea typeface="Arial"/>
+              <a:cs typeface="Arial"/>
+              <a:sym typeface="Arial"/>
+            </a:endParaRPr>
+          </a:p>
+        </p:txBody>
+      </p:sp>
+      <p:sp>
+        <p:nvSpPr>
+          <p:cNvPr id="295" name="Google Shape;295;g2fb95174dfe_0_247"/>
+          <p:cNvSpPr/>
+          <p:nvPr/>
+        </p:nvSpPr>
+        <p:spPr>
+          <a:xfrm>
+            <a:off x="7818120" y="216000"/>
+            <a:ext cx="1325400" cy="489600"/>
+          </a:xfrm>
+          <a:prstGeom prst="rect">
+            <a:avLst/>
+          </a:prstGeom>
+          <a:noFill/>
+          <a:ln>
+            <a:noFill/>
+          </a:ln>
+        </p:spPr>
+        <p:txBody>
+          <a:bodyPr spcFirstLastPara="1" wrap="square" lIns="90000" tIns="45000" rIns="90000" bIns="45000" anchor="t" anchorCtr="0">
+            <a:noAutofit/>
+          </a:bodyPr>
+          <a:lstStyle/>
+          <a:p>
+            <a:pPr marL="0" marR="0" lvl="0" indent="0" algn="l" rtl="0">
+              <a:lnSpc>
+                <a:spcPct val="100000"/>
+              </a:lnSpc>
+              <a:spcBef>
+                <a:spcPts val="0"/>
+              </a:spcBef>
+              <a:spcAft>
+                <a:spcPts val="0"/>
+              </a:spcAft>
+              <a:buNone/>
+            </a:pPr>
+            <a:r>
+              <a:rPr lang="fr-FR" sz="1400" b="0" strike="noStrike">
+                <a:solidFill>
+                  <a:srgbClr val="FFFFFF"/>
+                </a:solidFill>
+                <a:latin typeface="Arial"/>
+                <a:ea typeface="Arial"/>
+                <a:cs typeface="Arial"/>
+                <a:sym typeface="Arial"/>
+              </a:rPr>
+              <a:t>ECML/PKDD 2024 Tutorial</a:t>
+            </a:r>
+            <a:endParaRPr sz="1400" b="0" strike="noStrike">
+              <a:solidFill>
+                <a:srgbClr val="000000"/>
+              </a:solidFill>
+              <a:latin typeface="Arial"/>
+              <a:ea typeface="Arial"/>
+              <a:cs typeface="Arial"/>
+              <a:sym typeface="Arial"/>
+            </a:endParaRPr>
+          </a:p>
+        </p:txBody>
+      </p:sp>
+      <p:sp>
+        <p:nvSpPr>
+          <p:cNvPr id="296" name="Google Shape;296;g2fb95174dfe_0_247"/>
+          <p:cNvSpPr/>
+          <p:nvPr/>
+        </p:nvSpPr>
+        <p:spPr>
+          <a:xfrm>
+            <a:off x="4715300" y="1540175"/>
+            <a:ext cx="4192800" cy="2894400"/>
+          </a:xfrm>
+          <a:prstGeom prst="rect">
+            <a:avLst/>
+          </a:prstGeom>
+          <a:solidFill>
+            <a:srgbClr val="F2CDED"/>
+          </a:solidFill>
+          <a:ln w="10075" cap="flat" cmpd="sng">
+            <a:solidFill>
+              <a:srgbClr val="000000"/>
+            </a:solidFill>
+            <a:prstDash val="solid"/>
+            <a:round/>
+            <a:headEnd type="none" w="sm" len="sm"/>
+            <a:tailEnd type="none" w="sm" len="sm"/>
+          </a:ln>
+        </p:spPr>
+        <p:txBody>
+          <a:bodyPr spcFirstLastPara="1" wrap="square" lIns="54350" tIns="20150" rIns="54350" bIns="20150" anchor="t" anchorCtr="0">
+            <a:noAutofit/>
+          </a:bodyPr>
+          <a:lstStyle/>
+          <a:p>
+            <a:pPr marL="0" marR="0" lvl="0" indent="0" algn="l" rtl="0">
+              <a:lnSpc>
+                <a:spcPct val="90000"/>
+              </a:lnSpc>
+              <a:spcBef>
+                <a:spcPts val="0"/>
+              </a:spcBef>
+              <a:spcAft>
+                <a:spcPts val="0"/>
+              </a:spcAft>
+              <a:buNone/>
+            </a:pPr>
+            <a:r>
+              <a:rPr lang="fr-FR" sz="2100" b="1" u="sng" dirty="0" err="1"/>
+              <a:t>Planned</a:t>
+            </a:r>
+            <a:r>
+              <a:rPr lang="fr-FR" sz="2100" b="1" u="sng" dirty="0"/>
+              <a:t> </a:t>
+            </a:r>
+            <a:r>
+              <a:rPr lang="fr-FR" sz="2100" b="1" u="sng" dirty="0" err="1"/>
+              <a:t>implementations</a:t>
+            </a:r>
+            <a:r>
+              <a:rPr lang="fr-FR" sz="2100" dirty="0"/>
+              <a:t>:</a:t>
+            </a:r>
+            <a:endParaRPr sz="2100" dirty="0"/>
+          </a:p>
+          <a:p>
+            <a:pPr marL="0" marR="0" lvl="0" indent="0" algn="l" rtl="0">
+              <a:lnSpc>
+                <a:spcPct val="90000"/>
+              </a:lnSpc>
+              <a:spcBef>
+                <a:spcPts val="0"/>
+              </a:spcBef>
+              <a:spcAft>
+                <a:spcPts val="0"/>
+              </a:spcAft>
+              <a:buNone/>
+            </a:pPr>
+            <a:endParaRPr sz="2100" dirty="0"/>
+          </a:p>
+          <a:p>
+            <a:pPr marL="457200" marR="0" lvl="0" indent="-342900" algn="l" rtl="0">
+              <a:lnSpc>
+                <a:spcPct val="90000"/>
+              </a:lnSpc>
+              <a:spcBef>
+                <a:spcPts val="0"/>
+              </a:spcBef>
+              <a:spcAft>
+                <a:spcPts val="0"/>
+              </a:spcAft>
+              <a:buClr>
+                <a:schemeClr val="dk1"/>
+              </a:buClr>
+              <a:buSzPts val="1800"/>
+              <a:buChar char="➢"/>
+            </a:pPr>
+            <a:r>
+              <a:rPr lang="fr-FR" sz="2100" dirty="0">
+                <a:solidFill>
+                  <a:schemeClr val="dk1"/>
+                </a:solidFill>
+              </a:rPr>
+              <a:t>The diverse matrix profile </a:t>
+            </a:r>
+            <a:r>
+              <a:rPr lang="fr-FR" sz="2100" dirty="0" err="1">
+                <a:solidFill>
+                  <a:schemeClr val="dk1"/>
+                </a:solidFill>
+              </a:rPr>
+              <a:t>implementations</a:t>
+            </a:r>
+            <a:r>
+              <a:rPr lang="fr-FR" sz="2100" dirty="0">
+                <a:solidFill>
+                  <a:schemeClr val="dk1"/>
+                </a:solidFill>
+              </a:rPr>
+              <a:t> for </a:t>
+            </a:r>
+            <a:r>
+              <a:rPr lang="fr-FR" sz="2100" dirty="0" err="1">
+                <a:solidFill>
+                  <a:schemeClr val="dk1"/>
+                </a:solidFill>
+              </a:rPr>
+              <a:t>Euclidean</a:t>
+            </a:r>
+            <a:r>
+              <a:rPr lang="fr-FR" sz="2100" dirty="0">
+                <a:solidFill>
+                  <a:schemeClr val="dk1"/>
+                </a:solidFill>
+              </a:rPr>
+              <a:t> and DTW [4] </a:t>
+            </a:r>
+          </a:p>
+          <a:p>
+            <a:pPr marL="114300" marR="0" lvl="0" algn="l" rtl="0">
+              <a:lnSpc>
+                <a:spcPct val="90000"/>
+              </a:lnSpc>
+              <a:spcBef>
+                <a:spcPts val="0"/>
+              </a:spcBef>
+              <a:spcAft>
+                <a:spcPts val="0"/>
+              </a:spcAft>
+              <a:buClr>
+                <a:schemeClr val="dk1"/>
+              </a:buClr>
+              <a:buSzPts val="1800"/>
+            </a:pPr>
+            <a:endParaRPr sz="2100" dirty="0">
+              <a:solidFill>
+                <a:schemeClr val="dk1"/>
+              </a:solidFill>
+            </a:endParaRPr>
+          </a:p>
+          <a:p>
+            <a:pPr marL="457200" marR="0" lvl="0" indent="-342900" algn="l" rtl="0">
+              <a:lnSpc>
+                <a:spcPct val="90000"/>
+              </a:lnSpc>
+              <a:spcBef>
+                <a:spcPts val="0"/>
+              </a:spcBef>
+              <a:spcAft>
+                <a:spcPts val="0"/>
+              </a:spcAft>
+              <a:buClr>
+                <a:schemeClr val="dk1"/>
+              </a:buClr>
+              <a:buSzPts val="1800"/>
+              <a:buChar char="➢"/>
+            </a:pPr>
+            <a:r>
+              <a:rPr lang="fr-FR" sz="2100" dirty="0" err="1">
+                <a:solidFill>
+                  <a:schemeClr val="dk1"/>
+                </a:solidFill>
+              </a:rPr>
+              <a:t>Attempt</a:t>
+            </a:r>
+            <a:r>
+              <a:rPr lang="fr-FR" sz="2100" dirty="0">
+                <a:solidFill>
+                  <a:schemeClr val="dk1"/>
+                </a:solidFill>
+              </a:rPr>
+              <a:t> to </a:t>
+            </a:r>
+            <a:r>
+              <a:rPr lang="fr-FR" sz="2100" dirty="0" err="1">
+                <a:solidFill>
+                  <a:schemeClr val="dk1"/>
+                </a:solidFill>
+              </a:rPr>
+              <a:t>generalize</a:t>
+            </a:r>
+            <a:r>
+              <a:rPr lang="fr-FR" sz="2100" dirty="0">
+                <a:solidFill>
+                  <a:schemeClr val="dk1"/>
+                </a:solidFill>
+              </a:rPr>
+              <a:t> </a:t>
+            </a:r>
+            <a:r>
+              <a:rPr lang="fr-FR" sz="2100" dirty="0" err="1">
+                <a:solidFill>
+                  <a:schemeClr val="dk1"/>
+                </a:solidFill>
+              </a:rPr>
+              <a:t>their</a:t>
+            </a:r>
+            <a:r>
+              <a:rPr lang="fr-FR" sz="2100" dirty="0">
+                <a:solidFill>
+                  <a:schemeClr val="dk1"/>
+                </a:solidFill>
+              </a:rPr>
+              <a:t> DTW </a:t>
+            </a:r>
+            <a:r>
+              <a:rPr lang="fr-FR" sz="2100" dirty="0" err="1">
+                <a:solidFill>
+                  <a:schemeClr val="dk1"/>
+                </a:solidFill>
+              </a:rPr>
+              <a:t>approach</a:t>
+            </a:r>
+            <a:r>
+              <a:rPr lang="fr-FR" sz="2100" dirty="0">
+                <a:solidFill>
+                  <a:schemeClr val="dk1"/>
+                </a:solidFill>
+              </a:rPr>
+              <a:t> to </a:t>
+            </a:r>
+            <a:r>
+              <a:rPr lang="fr-FR" sz="2100" dirty="0" err="1">
+                <a:solidFill>
+                  <a:schemeClr val="dk1"/>
+                </a:solidFill>
+              </a:rPr>
+              <a:t>other</a:t>
+            </a:r>
+            <a:r>
+              <a:rPr lang="fr-FR" sz="2100" dirty="0">
+                <a:solidFill>
+                  <a:schemeClr val="dk1"/>
+                </a:solidFill>
+              </a:rPr>
+              <a:t> </a:t>
+            </a:r>
+            <a:r>
+              <a:rPr lang="fr-FR" sz="2100" dirty="0" err="1">
+                <a:solidFill>
+                  <a:schemeClr val="dk1"/>
+                </a:solidFill>
+              </a:rPr>
+              <a:t>elastic</a:t>
+            </a:r>
+            <a:r>
+              <a:rPr lang="fr-FR" sz="2100" dirty="0">
+                <a:solidFill>
+                  <a:schemeClr val="dk1"/>
+                </a:solidFill>
+              </a:rPr>
+              <a:t> distances</a:t>
+            </a:r>
+            <a:br>
+              <a:rPr lang="fr-FR" sz="2100" dirty="0">
+                <a:solidFill>
+                  <a:schemeClr val="dk1"/>
+                </a:solidFill>
+              </a:rPr>
+            </a:br>
+            <a:endParaRPr sz="2100" dirty="0">
+              <a:solidFill>
+                <a:schemeClr val="dk1"/>
+              </a:solidFill>
+            </a:endParaRPr>
+          </a:p>
+          <a:p>
+            <a:pPr marL="0" marR="0" lvl="0" indent="0" algn="l" rtl="0">
+              <a:lnSpc>
+                <a:spcPct val="90000"/>
+              </a:lnSpc>
+              <a:spcBef>
+                <a:spcPts val="0"/>
+              </a:spcBef>
+              <a:spcAft>
+                <a:spcPts val="0"/>
+              </a:spcAft>
+              <a:buNone/>
+            </a:pPr>
+            <a:endParaRPr sz="2100" dirty="0">
+              <a:solidFill>
+                <a:schemeClr val="dk1"/>
+              </a:solidFill>
+            </a:endParaRPr>
+          </a:p>
+          <a:p>
+            <a:pPr marL="457200" marR="0" lvl="0" indent="0" algn="l" rtl="0">
+              <a:lnSpc>
+                <a:spcPct val="90000"/>
+              </a:lnSpc>
+              <a:spcBef>
+                <a:spcPts val="0"/>
+              </a:spcBef>
+              <a:spcAft>
+                <a:spcPts val="0"/>
+              </a:spcAft>
+              <a:buNone/>
+            </a:pPr>
+            <a:endParaRPr sz="2100" dirty="0"/>
+          </a:p>
+          <a:p>
+            <a:pPr marL="0" marR="0" lvl="0" indent="0" algn="l" rtl="0">
+              <a:lnSpc>
+                <a:spcPct val="90000"/>
+              </a:lnSpc>
+              <a:spcBef>
+                <a:spcPts val="0"/>
+              </a:spcBef>
+              <a:spcAft>
+                <a:spcPts val="0"/>
+              </a:spcAft>
+              <a:buNone/>
+            </a:pPr>
+            <a:endParaRPr sz="2100" b="0" strike="noStrike" dirty="0">
+              <a:solidFill>
+                <a:srgbClr val="000000"/>
+              </a:solidFill>
+              <a:latin typeface="Arial"/>
+              <a:ea typeface="Arial"/>
+              <a:cs typeface="Arial"/>
+              <a:sym typeface="Arial"/>
+            </a:endParaRPr>
+          </a:p>
+        </p:txBody>
+      </p:sp>
+      <p:sp>
+        <p:nvSpPr>
+          <p:cNvPr id="297" name="Google Shape;297;g2fb95174dfe_0_247"/>
+          <p:cNvSpPr/>
+          <p:nvPr/>
+        </p:nvSpPr>
+        <p:spPr>
+          <a:xfrm>
+            <a:off x="146957" y="1951264"/>
+            <a:ext cx="4401593" cy="1934161"/>
+          </a:xfrm>
+          <a:prstGeom prst="rect">
+            <a:avLst/>
+          </a:prstGeom>
+          <a:solidFill>
+            <a:srgbClr val="F2CDED"/>
+          </a:solidFill>
+          <a:ln w="10075" cap="flat" cmpd="sng">
+            <a:solidFill>
+              <a:srgbClr val="000000"/>
+            </a:solidFill>
+            <a:prstDash val="solid"/>
+            <a:round/>
+            <a:headEnd type="none" w="sm" len="sm"/>
+            <a:tailEnd type="none" w="sm" len="sm"/>
+          </a:ln>
+        </p:spPr>
+        <p:txBody>
+          <a:bodyPr spcFirstLastPara="1" wrap="square" lIns="54350" tIns="20150" rIns="54350" bIns="20150" anchor="t" anchorCtr="0">
+            <a:noAutofit/>
+          </a:bodyPr>
+          <a:lstStyle/>
+          <a:p>
+            <a:pPr marL="0" lvl="0" indent="0" algn="l" rtl="0">
+              <a:lnSpc>
+                <a:spcPct val="90000"/>
+              </a:lnSpc>
+              <a:spcBef>
+                <a:spcPts val="0"/>
+              </a:spcBef>
+              <a:spcAft>
+                <a:spcPts val="0"/>
+              </a:spcAft>
+              <a:buNone/>
+            </a:pPr>
+            <a:r>
+              <a:rPr lang="fr-FR" sz="2100" b="1" u="sng" dirty="0">
+                <a:solidFill>
+                  <a:schemeClr val="dk1"/>
+                </a:solidFill>
+              </a:rPr>
+              <a:t>STOMP optimisations and </a:t>
+            </a:r>
+            <a:r>
+              <a:rPr lang="fr-FR" sz="2100" b="1" u="sng" dirty="0" err="1">
+                <a:solidFill>
+                  <a:schemeClr val="dk1"/>
+                </a:solidFill>
+              </a:rPr>
+              <a:t>refactoring</a:t>
+            </a:r>
+            <a:endParaRPr sz="2100" b="1" u="sng" dirty="0">
+              <a:solidFill>
+                <a:schemeClr val="dk1"/>
+              </a:solidFill>
+            </a:endParaRPr>
+          </a:p>
+          <a:p>
+            <a:pPr marL="0" lvl="0" indent="0" algn="l" rtl="0">
+              <a:lnSpc>
+                <a:spcPct val="90000"/>
+              </a:lnSpc>
+              <a:spcBef>
+                <a:spcPts val="0"/>
+              </a:spcBef>
+              <a:spcAft>
+                <a:spcPts val="0"/>
+              </a:spcAft>
+              <a:buNone/>
+            </a:pPr>
+            <a:endParaRPr sz="2100" dirty="0">
+              <a:solidFill>
+                <a:schemeClr val="dk1"/>
+              </a:solidFill>
+            </a:endParaRPr>
+          </a:p>
+          <a:p>
+            <a:pPr marL="457200" lvl="0" indent="-361950" algn="l" rtl="0">
+              <a:lnSpc>
+                <a:spcPct val="90000"/>
+              </a:lnSpc>
+              <a:spcBef>
+                <a:spcPts val="0"/>
+              </a:spcBef>
+              <a:spcAft>
+                <a:spcPts val="0"/>
+              </a:spcAft>
+              <a:buClr>
+                <a:schemeClr val="dk1"/>
+              </a:buClr>
+              <a:buSzPts val="2100"/>
+              <a:buChar char="➢"/>
+            </a:pPr>
+            <a:r>
+              <a:rPr lang="fr-FR" sz="2100" dirty="0">
+                <a:solidFill>
+                  <a:schemeClr val="dk1"/>
+                </a:solidFill>
+              </a:rPr>
+              <a:t>The </a:t>
+            </a:r>
+            <a:r>
+              <a:rPr lang="fr-FR" sz="2100" dirty="0" err="1">
+                <a:solidFill>
+                  <a:schemeClr val="dk1"/>
+                </a:solidFill>
+              </a:rPr>
+              <a:t>current</a:t>
+            </a:r>
+            <a:r>
+              <a:rPr lang="fr-FR" sz="2100" dirty="0">
+                <a:solidFill>
+                  <a:schemeClr val="dk1"/>
+                </a:solidFill>
+              </a:rPr>
+              <a:t> </a:t>
+            </a:r>
+            <a:r>
+              <a:rPr lang="en-GB" sz="2100" dirty="0">
+                <a:solidFill>
+                  <a:schemeClr val="dk1"/>
+                </a:solidFill>
+              </a:rPr>
+              <a:t>implementation</a:t>
+            </a:r>
+            <a:r>
+              <a:rPr lang="fr-FR" sz="2100" dirty="0">
+                <a:solidFill>
+                  <a:schemeClr val="dk1"/>
+                </a:solidFill>
+              </a:rPr>
+              <a:t> </a:t>
+            </a:r>
+            <a:r>
+              <a:rPr lang="fr-FR" sz="2100" dirty="0" err="1">
+                <a:solidFill>
+                  <a:schemeClr val="dk1"/>
+                </a:solidFill>
+              </a:rPr>
+              <a:t>is</a:t>
+            </a:r>
+            <a:r>
+              <a:rPr lang="fr-FR" sz="2100" dirty="0">
+                <a:solidFill>
+                  <a:schemeClr val="dk1"/>
+                </a:solidFill>
+              </a:rPr>
+              <a:t> a bit </a:t>
+            </a:r>
+            <a:r>
+              <a:rPr lang="fr-FR" sz="2100" dirty="0" err="1">
+                <a:solidFill>
+                  <a:schemeClr val="dk1"/>
+                </a:solidFill>
+              </a:rPr>
+              <a:t>messy</a:t>
+            </a:r>
+            <a:r>
+              <a:rPr lang="fr-FR" sz="2100" dirty="0">
+                <a:solidFill>
+                  <a:schemeClr val="dk1"/>
+                </a:solidFill>
+              </a:rPr>
+              <a:t>, and </a:t>
+            </a:r>
+            <a:r>
+              <a:rPr lang="fr-FR" sz="2100" dirty="0" err="1">
+                <a:solidFill>
+                  <a:schemeClr val="dk1"/>
+                </a:solidFill>
+              </a:rPr>
+              <a:t>could</a:t>
+            </a:r>
+            <a:r>
+              <a:rPr lang="fr-FR" sz="2100" dirty="0">
+                <a:solidFill>
+                  <a:schemeClr val="dk1"/>
+                </a:solidFill>
+              </a:rPr>
+              <a:t> use </a:t>
+            </a:r>
+            <a:r>
+              <a:rPr lang="fr-FR" sz="2100" dirty="0" err="1">
+                <a:solidFill>
+                  <a:schemeClr val="dk1"/>
+                </a:solidFill>
+              </a:rPr>
+              <a:t>some</a:t>
+            </a:r>
+            <a:r>
+              <a:rPr lang="fr-FR" sz="2100" dirty="0">
+                <a:solidFill>
+                  <a:schemeClr val="dk1"/>
+                </a:solidFill>
+              </a:rPr>
+              <a:t> optimisations and </a:t>
+            </a:r>
+            <a:r>
+              <a:rPr lang="fr-FR" sz="2100" dirty="0" err="1">
+                <a:solidFill>
+                  <a:schemeClr val="dk1"/>
+                </a:solidFill>
+              </a:rPr>
+              <a:t>refactoring</a:t>
+            </a:r>
+            <a:endParaRPr sz="2100" dirty="0">
+              <a:solidFill>
+                <a:schemeClr val="dk1"/>
+              </a:solidFill>
+            </a:endParaRPr>
+          </a:p>
+          <a:p>
+            <a:pPr marL="457200" marR="0" lvl="0" indent="0" algn="l" rtl="0">
+              <a:lnSpc>
+                <a:spcPct val="90000"/>
+              </a:lnSpc>
+              <a:spcBef>
+                <a:spcPts val="0"/>
+              </a:spcBef>
+              <a:spcAft>
+                <a:spcPts val="0"/>
+              </a:spcAft>
+              <a:buNone/>
+            </a:pPr>
+            <a:endParaRPr sz="2000" b="1" u="sng" dirty="0"/>
+          </a:p>
+          <a:p>
+            <a:pPr marL="0" marR="0" lvl="0" indent="0" algn="l" rtl="0">
+              <a:lnSpc>
+                <a:spcPct val="90000"/>
+              </a:lnSpc>
+              <a:spcBef>
+                <a:spcPts val="0"/>
+              </a:spcBef>
+              <a:spcAft>
+                <a:spcPts val="0"/>
+              </a:spcAft>
+              <a:buNone/>
+            </a:pPr>
+            <a:endParaRPr sz="2000" b="1" u="sng" dirty="0"/>
+          </a:p>
+        </p:txBody>
+      </p:sp>
+      <p:sp>
+        <p:nvSpPr>
+          <p:cNvPr id="2" name="Rectangle 1">
+            <a:extLst>
+              <a:ext uri="{FF2B5EF4-FFF2-40B4-BE49-F238E27FC236}">
+                <a16:creationId xmlns:a16="http://schemas.microsoft.com/office/drawing/2014/main" id="{15F2A667-EBCD-CFA5-54E9-48854F7BEB9A}"/>
+              </a:ext>
+            </a:extLst>
+          </p:cNvPr>
+          <p:cNvSpPr/>
+          <p:nvPr/>
+        </p:nvSpPr>
+        <p:spPr>
+          <a:xfrm>
+            <a:off x="6784521" y="4914901"/>
+            <a:ext cx="2359479" cy="204107"/>
+          </a:xfrm>
+          <a:prstGeom prst="rect">
+            <a:avLst/>
+          </a:prstGeom>
+          <a:ln>
+            <a:solidFill>
+              <a:schemeClr val="bg1"/>
+            </a:solidFill>
+          </a:ln>
+        </p:spPr>
+        <p:style>
+          <a:lnRef idx="2">
+            <a:schemeClr val="accent6"/>
+          </a:lnRef>
+          <a:fillRef idx="1">
+            <a:schemeClr val="lt1"/>
+          </a:fillRef>
+          <a:effectRef idx="0">
+            <a:schemeClr val="accent6"/>
+          </a:effectRef>
+          <a:fontRef idx="minor">
+            <a:schemeClr val="dk1"/>
+          </a:fontRef>
+        </p:style>
+        <p:txBody>
+          <a:bodyPr rtlCol="0" anchor="ctr"/>
+          <a:lstStyle/>
+          <a:p>
+            <a:pPr algn="ctr"/>
+            <a:endParaRPr lang="fr-FR"/>
+          </a:p>
+        </p:txBody>
+      </p:sp>
+    </p:spTree>
+  </p:cSld>
+  <p:clrMapOvr>
+    <a:masterClrMapping/>
+  </p:clrMapOvr>
+</p:sld>
+</file>
+
+<file path=ppt/slides/slide21.xml><?xml version="1.0" encoding="utf-8"?>
 <p:sld xmlns:a="http://schemas.openxmlformats.org/drawingml/2006/main" xmlns:r="http://schemas.openxmlformats.org/officeDocument/2006/relationships" xmlns:p="http://schemas.openxmlformats.org/presentationml/2006/main">
   <p:cSld>
     <p:spTree>
@@ -32207,6 +33322,55 @@
           <a:chExt cx="0" cy="0"/>
         </a:xfrm>
       </p:grpSpPr>
+      <p:sp>
+        <p:nvSpPr>
+          <p:cNvPr id="2" name="Rectangle 1">
+            <a:extLst>
+              <a:ext uri="{FF2B5EF4-FFF2-40B4-BE49-F238E27FC236}">
+                <a16:creationId xmlns:a16="http://schemas.microsoft.com/office/drawing/2014/main" id="{7DC46127-B6D8-AD31-E8CC-DF048DB54DF8}"/>
+              </a:ext>
+            </a:extLst>
+          </p:cNvPr>
+          <p:cNvSpPr/>
+          <p:nvPr/>
+        </p:nvSpPr>
+        <p:spPr>
+          <a:xfrm>
+            <a:off x="6792685" y="4931229"/>
+            <a:ext cx="2359479" cy="204107"/>
+          </a:xfrm>
+          <a:prstGeom prst="rect">
+            <a:avLst/>
+          </a:prstGeom>
+          <a:ln>
+            <a:solidFill>
+              <a:schemeClr val="bg1"/>
+            </a:solidFill>
+          </a:ln>
+        </p:spPr>
+        <p:style>
+          <a:lnRef idx="2">
+            <a:schemeClr val="accent6"/>
+          </a:lnRef>
+          <a:fillRef idx="1">
+            <a:schemeClr val="lt1"/>
+          </a:fillRef>
+          <a:effectRef idx="0">
+            <a:schemeClr val="accent6"/>
+          </a:effectRef>
+          <a:fontRef idx="minor">
+            <a:schemeClr val="dk1"/>
+          </a:fontRef>
+        </p:style>
+        <p:txBody>
+          <a:bodyPr rtlCol="0" anchor="ctr"/>
+          <a:lstStyle/>
+          <a:p>
+            <a:pPr algn="ctr"/>
+            <a:endParaRPr lang="fr-FR"/>
+          </a:p>
+        </p:txBody>
+      </p:sp>
       <p:sp>
         <p:nvSpPr>
           <p:cNvPr id="302" name="Google Shape;302;g2fb95174dfe_0_72"/>
@@ -32645,7 +33809,7 @@
 </p:sld>
 </file>
 
-<file path=ppt/slides/slide21.xml><?xml version="1.0" encoding="utf-8"?>
+<file path=ppt/slides/slide22.xml><?xml version="1.0" encoding="utf-8"?>
 <p:sld xmlns:a="http://schemas.openxmlformats.org/drawingml/2006/main" xmlns:r="http://schemas.openxmlformats.org/officeDocument/2006/relationships" xmlns:p="http://schemas.openxmlformats.org/presentationml/2006/main">
   <p:cSld>
     <p:spTree>
@@ -33192,6 +34356,55 @@
           </a:p>
         </p:txBody>
       </p:sp>
+      <p:sp>
+        <p:nvSpPr>
+          <p:cNvPr id="2" name="Rectangle 1">
+            <a:extLst>
+              <a:ext uri="{FF2B5EF4-FFF2-40B4-BE49-F238E27FC236}">
+                <a16:creationId xmlns:a16="http://schemas.microsoft.com/office/drawing/2014/main" id="{71CDDCD7-BD43-A5F7-DE1A-6EA2497EAF16}"/>
+              </a:ext>
+            </a:extLst>
+          </p:cNvPr>
+          <p:cNvSpPr/>
+          <p:nvPr/>
+        </p:nvSpPr>
+        <p:spPr>
+          <a:xfrm>
+            <a:off x="6792685" y="4931229"/>
+            <a:ext cx="2359479" cy="204107"/>
+          </a:xfrm>
+          <a:prstGeom prst="rect">
+            <a:avLst/>
+          </a:prstGeom>
+          <a:ln>
+            <a:solidFill>
+              <a:schemeClr val="bg1"/>
+            </a:solidFill>
+          </a:ln>
+        </p:spPr>
+        <p:style>
+          <a:lnRef idx="2">
+            <a:schemeClr val="accent6"/>
+          </a:lnRef>
+          <a:fillRef idx="1">
+            <a:schemeClr val="lt1"/>
+          </a:fillRef>
+          <a:effectRef idx="0">
+            <a:schemeClr val="accent6"/>
+          </a:effectRef>
+          <a:fontRef idx="minor">
+            <a:schemeClr val="dk1"/>
+          </a:fontRef>
+        </p:style>
+        <p:txBody>
+          <a:bodyPr rtlCol="0" anchor="ctr"/>
+          <a:lstStyle/>
+          <a:p>
+            <a:pPr algn="ctr"/>
+            <a:endParaRPr lang="fr-FR"/>
+          </a:p>
+        </p:txBody>
+      </p:sp>
     </p:spTree>
   </p:cSld>
   <p:clrMapOvr>
@@ -33217,6 +34430,55 @@
           <a:chExt cx="0" cy="0"/>
         </a:xfrm>
       </p:grpSpPr>
+      <p:sp>
+        <p:nvSpPr>
+          <p:cNvPr id="2" name="Rectangle 1">
+            <a:extLst>
+              <a:ext uri="{FF2B5EF4-FFF2-40B4-BE49-F238E27FC236}">
+                <a16:creationId xmlns:a16="http://schemas.microsoft.com/office/drawing/2014/main" id="{A3E163D1-3E50-5299-FCCD-AD9D638500B0}"/>
+              </a:ext>
+            </a:extLst>
+          </p:cNvPr>
+          <p:cNvSpPr/>
+          <p:nvPr/>
+        </p:nvSpPr>
+        <p:spPr>
+          <a:xfrm>
+            <a:off x="6792685" y="4931229"/>
+            <a:ext cx="2359479" cy="204107"/>
+          </a:xfrm>
+          <a:prstGeom prst="rect">
+            <a:avLst/>
+          </a:prstGeom>
+          <a:ln>
+            <a:solidFill>
+              <a:schemeClr val="bg1"/>
+            </a:solidFill>
+          </a:ln>
+        </p:spPr>
+        <p:style>
+          <a:lnRef idx="2">
+            <a:schemeClr val="accent6"/>
+          </a:lnRef>
+          <a:fillRef idx="1">
+            <a:schemeClr val="lt1"/>
+          </a:fillRef>
+          <a:effectRef idx="0">
+            <a:schemeClr val="accent6"/>
+          </a:effectRef>
+          <a:fontRef idx="minor">
+            <a:schemeClr val="dk1"/>
+          </a:fontRef>
+        </p:style>
+        <p:txBody>
+          <a:bodyPr rtlCol="0" anchor="ctr"/>
+          <a:lstStyle/>
+          <a:p>
+            <a:pPr algn="ctr"/>
+            <a:endParaRPr lang="fr-FR"/>
+          </a:p>
+        </p:txBody>
+      </p:sp>
       <p:sp>
         <p:nvSpPr>
           <p:cNvPr id="163" name="Google Shape;163;g2fb95174dfe_0_35"/>
@@ -33948,6 +35210,55 @@
           <a:chExt cx="0" cy="0"/>
         </a:xfrm>
       </p:grpSpPr>
+      <p:sp>
+        <p:nvSpPr>
+          <p:cNvPr id="2" name="Rectangle 1">
+            <a:extLst>
+              <a:ext uri="{FF2B5EF4-FFF2-40B4-BE49-F238E27FC236}">
+                <a16:creationId xmlns:a16="http://schemas.microsoft.com/office/drawing/2014/main" id="{5D26E38A-A2EA-69E6-DC20-893B50045737}"/>
+              </a:ext>
+            </a:extLst>
+          </p:cNvPr>
+          <p:cNvSpPr/>
+          <p:nvPr/>
+        </p:nvSpPr>
+        <p:spPr>
+          <a:xfrm>
+            <a:off x="6792685" y="4931229"/>
+            <a:ext cx="2359479" cy="204107"/>
+          </a:xfrm>
+          <a:prstGeom prst="rect">
+            <a:avLst/>
+          </a:prstGeom>
+          <a:ln>
+            <a:solidFill>
+              <a:schemeClr val="bg1"/>
+            </a:solidFill>
+          </a:ln>
+        </p:spPr>
+        <p:style>
+          <a:lnRef idx="2">
+            <a:schemeClr val="accent6"/>
+          </a:lnRef>
+          <a:fillRef idx="1">
+            <a:schemeClr val="lt1"/>
+          </a:fillRef>
+          <a:effectRef idx="0">
+            <a:schemeClr val="accent6"/>
+          </a:effectRef>
+          <a:fontRef idx="minor">
+            <a:schemeClr val="dk1"/>
+          </a:fontRef>
+        </p:style>
+        <p:txBody>
+          <a:bodyPr rtlCol="0" anchor="ctr"/>
+          <a:lstStyle/>
+          <a:p>
+            <a:pPr algn="ctr"/>
+            <a:endParaRPr lang="fr-FR"/>
+          </a:p>
+        </p:txBody>
+      </p:sp>
       <p:pic>
         <p:nvPicPr>
           <p:cNvPr id="7" name="Image 6" descr="Une image contenant ligne, Tracé, diagramme, texte&#10;&#10;Description générée automatiquement">
@@ -34189,6 +35500,55 @@
           <a:chExt cx="0" cy="0"/>
         </a:xfrm>
       </p:grpSpPr>
+      <p:sp>
+        <p:nvSpPr>
+          <p:cNvPr id="2" name="Rectangle 1">
+            <a:extLst>
+              <a:ext uri="{FF2B5EF4-FFF2-40B4-BE49-F238E27FC236}">
+                <a16:creationId xmlns:a16="http://schemas.microsoft.com/office/drawing/2014/main" id="{EBF420BA-A99C-F012-C967-4A0AE3E12306}"/>
+              </a:ext>
+            </a:extLst>
+          </p:cNvPr>
+          <p:cNvSpPr/>
+          <p:nvPr/>
+        </p:nvSpPr>
+        <p:spPr>
+          <a:xfrm>
+            <a:off x="6792685" y="4931229"/>
+            <a:ext cx="2359479" cy="204107"/>
+          </a:xfrm>
+          <a:prstGeom prst="rect">
+            <a:avLst/>
+          </a:prstGeom>
+          <a:ln>
+            <a:solidFill>
+              <a:schemeClr val="bg1"/>
+            </a:solidFill>
+          </a:ln>
+        </p:spPr>
+        <p:style>
+          <a:lnRef idx="2">
+            <a:schemeClr val="accent6"/>
+          </a:lnRef>
+          <a:fillRef idx="1">
+            <a:schemeClr val="lt1"/>
+          </a:fillRef>
+          <a:effectRef idx="0">
+            <a:schemeClr val="accent6"/>
+          </a:effectRef>
+          <a:fontRef idx="minor">
+            <a:schemeClr val="dk1"/>
+          </a:fontRef>
+        </p:style>
+        <p:txBody>
+          <a:bodyPr rtlCol="0" anchor="ctr"/>
+          <a:lstStyle/>
+          <a:p>
+            <a:pPr algn="ctr"/>
+            <a:endParaRPr lang="fr-FR"/>
+          </a:p>
+        </p:txBody>
+      </p:sp>
       <p:sp>
         <p:nvSpPr>
           <p:cNvPr id="177" name="Google Shape;177;p4"/>
@@ -34734,7 +36094,7 @@
               <a:buNone/>
             </a:pPr>
             <a:r>
-              <a:rPr lang="fr-FR" sz="2100" b="1" strike="noStrike">
+              <a:rPr lang="fr-FR" sz="2100" b="1" strike="noStrike" dirty="0">
                 <a:solidFill>
                   <a:srgbClr val="000000"/>
                 </a:solidFill>
@@ -34743,9 +36103,105 @@
                 <a:cs typeface="Arial"/>
                 <a:sym typeface="Arial"/>
               </a:rPr>
-              <a:t>Case 1 : What is the best match of this pattern ?</a:t>
-            </a:r>
-            <a:endParaRPr sz="2100" b="0" strike="noStrike">
+              <a:t>Case 1 : </a:t>
+            </a:r>
+            <a:r>
+              <a:rPr lang="fr-FR" sz="2100" b="1" strike="noStrike" dirty="0" err="1">
+                <a:solidFill>
+                  <a:srgbClr val="000000"/>
+                </a:solidFill>
+                <a:latin typeface="Arial"/>
+                <a:ea typeface="Arial"/>
+                <a:cs typeface="Arial"/>
+                <a:sym typeface="Arial"/>
+              </a:rPr>
+              <a:t>What</a:t>
+            </a:r>
+            <a:r>
+              <a:rPr lang="fr-FR" sz="2100" b="1" strike="noStrike" dirty="0">
+                <a:solidFill>
+                  <a:srgbClr val="000000"/>
+                </a:solidFill>
+                <a:latin typeface="Arial"/>
+                <a:ea typeface="Arial"/>
+                <a:cs typeface="Arial"/>
+                <a:sym typeface="Arial"/>
+              </a:rPr>
+              <a:t> </a:t>
+            </a:r>
+            <a:r>
+              <a:rPr lang="fr-FR" sz="2100" b="1" strike="noStrike" dirty="0" err="1">
+                <a:solidFill>
+                  <a:srgbClr val="000000"/>
+                </a:solidFill>
+                <a:latin typeface="Arial"/>
+                <a:ea typeface="Arial"/>
+                <a:cs typeface="Arial"/>
+                <a:sym typeface="Arial"/>
+              </a:rPr>
+              <a:t>is</a:t>
+            </a:r>
+            <a:r>
+              <a:rPr lang="fr-FR" sz="2100" b="1" strike="noStrike" dirty="0">
+                <a:solidFill>
+                  <a:srgbClr val="000000"/>
+                </a:solidFill>
+                <a:latin typeface="Arial"/>
+                <a:ea typeface="Arial"/>
+                <a:cs typeface="Arial"/>
+                <a:sym typeface="Arial"/>
+              </a:rPr>
+              <a:t> the best match of </a:t>
+            </a:r>
+            <a:r>
+              <a:rPr lang="fr-FR" sz="2100" b="1" strike="noStrike" dirty="0" err="1">
+                <a:solidFill>
+                  <a:srgbClr val="000000"/>
+                </a:solidFill>
+                <a:latin typeface="Arial"/>
+                <a:ea typeface="Arial"/>
+                <a:cs typeface="Arial"/>
+                <a:sym typeface="Arial"/>
+              </a:rPr>
+              <a:t>this</a:t>
+            </a:r>
+            <a:r>
+              <a:rPr lang="fr-FR" sz="2100" b="1" strike="noStrike" dirty="0">
+                <a:solidFill>
+                  <a:srgbClr val="000000"/>
+                </a:solidFill>
+                <a:latin typeface="Arial"/>
+                <a:ea typeface="Arial"/>
+                <a:cs typeface="Arial"/>
+                <a:sym typeface="Arial"/>
+              </a:rPr>
+              <a:t> </a:t>
+            </a:r>
+            <a:r>
+              <a:rPr lang="fr-FR" sz="2100" b="1" strike="noStrike" dirty="0" err="1">
+                <a:solidFill>
+                  <a:srgbClr val="000000"/>
+                </a:solidFill>
+                <a:latin typeface="Arial"/>
+                <a:ea typeface="Arial"/>
+                <a:cs typeface="Arial"/>
+                <a:sym typeface="Arial"/>
+              </a:rPr>
+              <a:t>query</a:t>
+            </a:r>
+            <a:r>
+              <a:rPr lang="fr-FR" sz="2100" b="1" strike="noStrike" dirty="0">
+                <a:solidFill>
+                  <a:srgbClr val="000000"/>
+                </a:solidFill>
+                <a:latin typeface="Arial"/>
+                <a:ea typeface="Arial"/>
+                <a:cs typeface="Arial"/>
+                <a:sym typeface="Arial"/>
+              </a:rPr>
+              <a:t> ?</a:t>
+            </a:r>
+            <a:endParaRPr sz="2100" b="0" strike="noStrike" dirty="0">
               <a:solidFill>
                 <a:srgbClr val="000000"/>
               </a:solidFill>
@@ -34817,6 +36273,55 @@
       </p:grpSpPr>
       <p:sp>
         <p:nvSpPr>
+          <p:cNvPr id="2" name="Rectangle 1">
+            <a:extLst>
+              <a:ext uri="{FF2B5EF4-FFF2-40B4-BE49-F238E27FC236}">
+                <a16:creationId xmlns:a16="http://schemas.microsoft.com/office/drawing/2014/main" id="{819F7FA8-6F19-10D5-17A5-2CFC4CF46976}"/>
+              </a:ext>
+            </a:extLst>
+          </p:cNvPr>
+          <p:cNvSpPr/>
+          <p:nvPr/>
+        </p:nvSpPr>
+        <p:spPr>
+          <a:xfrm>
+            <a:off x="6792685" y="4931229"/>
+            <a:ext cx="2359479" cy="204107"/>
+          </a:xfrm>
+          <a:prstGeom prst="rect">
+            <a:avLst/>
+          </a:prstGeom>
+          <a:ln>
+            <a:solidFill>
+              <a:schemeClr val="bg1"/>
+            </a:solidFill>
+          </a:ln>
+        </p:spPr>
+        <p:style>
+          <a:lnRef idx="2">
+            <a:schemeClr val="accent6"/>
+          </a:lnRef>
+          <a:fillRef idx="1">
+            <a:schemeClr val="lt1"/>
+          </a:fillRef>
+          <a:effectRef idx="0">
+            <a:schemeClr val="accent6"/>
+          </a:effectRef>
+          <a:fontRef idx="minor">
+            <a:schemeClr val="dk1"/>
+          </a:fontRef>
+        </p:style>
+        <p:txBody>
+          <a:bodyPr rtlCol="0" anchor="ctr"/>
+          <a:lstStyle/>
+          <a:p>
+            <a:pPr algn="ctr"/>
+            <a:endParaRPr lang="fr-FR"/>
+          </a:p>
+        </p:txBody>
+      </p:sp>
+      <p:sp>
+        <p:nvSpPr>
           <p:cNvPr id="185" name="Google Shape;185;g2fb95174dfe_0_114"/>
           <p:cNvSpPr/>
           <p:nvPr/>
@@ -35088,7 +36593,31 @@
                 <a:cs typeface="Arial"/>
                 <a:sym typeface="Arial"/>
               </a:rPr>
-              <a:t> pattern ?</a:t>
+              <a:t> </a:t>
+            </a:r>
+            <a:r>
+              <a:rPr lang="fr-FR" sz="2100" b="1" strike="noStrike" dirty="0" err="1">
+                <a:solidFill>
+                  <a:srgbClr val="000000"/>
+                </a:solidFill>
+                <a:latin typeface="Arial"/>
+                <a:ea typeface="Arial"/>
+                <a:cs typeface="Arial"/>
+                <a:sym typeface="Arial"/>
+              </a:rPr>
+              <a:t>query</a:t>
+            </a:r>
+            <a:r>
+              <a:rPr lang="fr-FR" sz="2100" b="1" strike="noStrike" dirty="0">
+                <a:solidFill>
+                  <a:srgbClr val="000000"/>
+                </a:solidFill>
+                <a:latin typeface="Arial"/>
+                <a:ea typeface="Arial"/>
+                <a:cs typeface="Arial"/>
+                <a:sym typeface="Arial"/>
+              </a:rPr>
+              <a:t> ?</a:t>
             </a:r>
             <a:endParaRPr sz="2100" b="0" strike="noStrike" dirty="0">
               <a:solidFill>
@@ -35157,6 +36686,55 @@
       </p:grpSpPr>
       <p:sp>
         <p:nvSpPr>
+          <p:cNvPr id="2" name="Rectangle 1">
+            <a:extLst>
+              <a:ext uri="{FF2B5EF4-FFF2-40B4-BE49-F238E27FC236}">
+                <a16:creationId xmlns:a16="http://schemas.microsoft.com/office/drawing/2014/main" id="{27B2DDDE-89B9-598C-6B4B-ABB235F673E0}"/>
+              </a:ext>
+            </a:extLst>
+          </p:cNvPr>
+          <p:cNvSpPr/>
+          <p:nvPr/>
+        </p:nvSpPr>
+        <p:spPr>
+          <a:xfrm>
+            <a:off x="6792685" y="4931229"/>
+            <a:ext cx="2359479" cy="204107"/>
+          </a:xfrm>
+          <a:prstGeom prst="rect">
+            <a:avLst/>
+          </a:prstGeom>
+          <a:ln>
+            <a:solidFill>
+              <a:schemeClr val="bg1"/>
+            </a:solidFill>
+          </a:ln>
+        </p:spPr>
+        <p:style>
+          <a:lnRef idx="2">
+            <a:schemeClr val="accent6"/>
+          </a:lnRef>
+          <a:fillRef idx="1">
+            <a:schemeClr val="lt1"/>
+          </a:fillRef>
+          <a:effectRef idx="0">
+            <a:schemeClr val="accent6"/>
+          </a:effectRef>
+          <a:fontRef idx="minor">
+            <a:schemeClr val="dk1"/>
+          </a:fontRef>
+        </p:style>
+        <p:txBody>
+          <a:bodyPr rtlCol="0" anchor="ctr"/>
+          <a:lstStyle/>
+          <a:p>
+            <a:pPr algn="ctr"/>
+            <a:endParaRPr lang="fr-FR"/>
+          </a:p>
+        </p:txBody>
+      </p:sp>
+      <p:sp>
+        <p:nvSpPr>
           <p:cNvPr id="193" name="Google Shape;193;g2fb95174dfe_0_89"/>
           <p:cNvSpPr/>
           <p:nvPr/>
@@ -35428,7 +37006,19 @@
                 <a:cs typeface="Arial"/>
                 <a:sym typeface="Arial"/>
               </a:rPr>
-              <a:t> pattern</a:t>
+              <a:t> </a:t>
+            </a:r>
+            <a:r>
+              <a:rPr lang="fr-FR" sz="2100" b="1" strike="noStrike" dirty="0" err="1">
+                <a:solidFill>
+                  <a:srgbClr val="000000"/>
+                </a:solidFill>
+                <a:latin typeface="Arial"/>
+                <a:ea typeface="Arial"/>
+                <a:cs typeface="Arial"/>
+                <a:sym typeface="Arial"/>
+              </a:rPr>
+              <a:t>query</a:t>
             </a:r>
             <a:r>
               <a:rPr lang="fr-FR" sz="2100" b="1" dirty="0"/>
@@ -35929,6 +37519,55 @@
               <a:rPr lang="fr-FR" dirty="0"/>
               <a:t> !</a:t>
             </a:r>
+          </a:p>
+        </p:txBody>
+      </p:sp>
+      <p:sp>
+        <p:nvSpPr>
+          <p:cNvPr id="3" name="Rectangle 2">
+            <a:extLst>
+              <a:ext uri="{FF2B5EF4-FFF2-40B4-BE49-F238E27FC236}">
+                <a16:creationId xmlns:a16="http://schemas.microsoft.com/office/drawing/2014/main" id="{FEB35FE9-F5EE-F0C6-42CC-D7F8EC98634B}"/>
+              </a:ext>
+            </a:extLst>
+          </p:cNvPr>
+          <p:cNvSpPr/>
+          <p:nvPr/>
+        </p:nvSpPr>
+        <p:spPr>
+          <a:xfrm>
+            <a:off x="6792685" y="4931229"/>
+            <a:ext cx="2359479" cy="204107"/>
+          </a:xfrm>
+          <a:prstGeom prst="rect">
+            <a:avLst/>
+          </a:prstGeom>
+          <a:ln>
+            <a:solidFill>
+              <a:schemeClr val="bg1"/>
+            </a:solidFill>
+          </a:ln>
+        </p:spPr>
+        <p:style>
+          <a:lnRef idx="2">
+            <a:schemeClr val="accent6"/>
+          </a:lnRef>
+          <a:fillRef idx="1">
+            <a:schemeClr val="lt1"/>
+          </a:fillRef>
+          <a:effectRef idx="0">
+            <a:schemeClr val="accent6"/>
+          </a:effectRef>
+          <a:fontRef idx="minor">
+            <a:schemeClr val="dk1"/>
+          </a:fontRef>
+        </p:style>
+        <p:txBody>
+          <a:bodyPr rtlCol="0" anchor="ctr"/>
+          <a:lstStyle/>
+          <a:p>
+            <a:pPr algn="ctr"/>
+            <a:endParaRPr lang="fr-FR"/>
           </a:p>
         </p:txBody>
       </p:sp>

</xml_diff>

<commit_message>
Add files via upload (#48)
</commit_message>
<xml_diff>
--- a/ECML-2024/Slides/part4_similarity_search.pptx
+++ b/ECML-2024/Slides/part4_similarity_search.pptx
@@ -275,7 +275,7 @@
       <p15:sldGuideLst xmlns:p15="http://schemas.microsoft.com/office/powerpoint/2012/main"/>
     </p:ext>
     <p:ext uri="GoogleSlidesCustomDataVersion2">
-      <go:slidesCustomData xmlns="" xmlns:mc="http://schemas.openxmlformats.org/markup-compatibility/2006" xmlns:mv="urn:schemas-microsoft-com:mac:vml" xmlns:c="http://schemas.openxmlformats.org/drawingml/2006/chart" xmlns:dgm="http://schemas.openxmlformats.org/drawingml/2006/diagram" xmlns:o="urn:schemas-microsoft-com:office:office" xmlns:v="urn:schemas-microsoft-com:vml" xmlns:pvml="urn:schemas-microsoft-com:office:powerpoint" xmlns:com="http://schemas.openxmlformats.org/drawingml/2006/compatibility" xmlns:p14="http://schemas.microsoft.com/office/powerpoint/2010/main" xmlns:p15="http://schemas.microsoft.com/office/powerpoint/2012/main" xmlns:ahyp="http://schemas.microsoft.com/office/drawing/2018/hyperlinkcolor" xmlns:go="http://customooxmlschemas.google.com/" r:id="rId28" roundtripDataSignature="AMtx7mjXkaOxpBdllwSmIqdcDSnsAXmUlQ=="/>
+      <go:slidesCustomData xmlns:go="http://customooxmlschemas.google.com/" xmlns:ahyp="http://schemas.microsoft.com/office/drawing/2018/hyperlinkcolor" xmlns:p15="http://schemas.microsoft.com/office/powerpoint/2012/main" xmlns:p14="http://schemas.microsoft.com/office/powerpoint/2010/main" xmlns:com="http://schemas.openxmlformats.org/drawingml/2006/compatibility" xmlns:pvml="urn:schemas-microsoft-com:office:powerpoint" xmlns:v="urn:schemas-microsoft-com:vml" xmlns:o="urn:schemas-microsoft-com:office:office" xmlns:dgm="http://schemas.openxmlformats.org/drawingml/2006/diagram" xmlns:c="http://schemas.openxmlformats.org/drawingml/2006/chart" xmlns:mv="urn:schemas-microsoft-com:mac:vml" xmlns:mc="http://schemas.openxmlformats.org/markup-compatibility/2006" xmlns="" r:id="rId28" roundtripDataSignature="AMtx7mjXkaOxpBdllwSmIqdcDSnsAXmUlQ=="/>
     </p:ext>
   </p:extLst>
 </p:presentation>
@@ -36056,7 +36056,7 @@
         </p:nvSpPr>
         <p:spPr>
           <a:xfrm>
-            <a:off x="252000" y="1080000"/>
+            <a:off x="252000" y="933046"/>
             <a:ext cx="8604000" cy="360000"/>
           </a:xfrm>
           <a:prstGeom prst="rect">
@@ -36229,8 +36229,8 @@
         </p:blipFill>
         <p:spPr>
           <a:xfrm>
-            <a:off x="208125" y="1520250"/>
-            <a:ext cx="8691755" cy="3398699"/>
+            <a:off x="1" y="1317538"/>
+            <a:ext cx="9143640" cy="3825962"/>
           </a:xfrm>
           <a:prstGeom prst="rect">
             <a:avLst/>
@@ -36450,7 +36450,7 @@
         </p:nvSpPr>
         <p:spPr>
           <a:xfrm>
-            <a:off x="252000" y="1080000"/>
+            <a:off x="252000" y="965702"/>
             <a:ext cx="8604000" cy="360000"/>
           </a:xfrm>
           <a:prstGeom prst="rect">
@@ -36647,8 +36647,8 @@
         </p:blipFill>
         <p:spPr>
           <a:xfrm>
-            <a:off x="152400" y="1556225"/>
-            <a:ext cx="8782976" cy="3434876"/>
+            <a:off x="-57150" y="1396094"/>
+            <a:ext cx="9208834" cy="3747406"/>
           </a:xfrm>
           <a:prstGeom prst="rect">
             <a:avLst/>
@@ -36863,8 +36863,8 @@
         </p:nvSpPr>
         <p:spPr>
           <a:xfrm>
-            <a:off x="324000" y="950100"/>
-            <a:ext cx="8532000" cy="590400"/>
+            <a:off x="324000" y="966428"/>
+            <a:ext cx="8532000" cy="323529"/>
           </a:xfrm>
           <a:prstGeom prst="rect">
             <a:avLst/>
@@ -36901,7 +36901,7 @@
               <a:buNone/>
             </a:pPr>
             <a:r>
-              <a:rPr lang="fr-FR" sz="2100" b="1" strike="noStrike" dirty="0">
+              <a:rPr lang="fr-FR" sz="1800" b="1" strike="noStrike" dirty="0">
                 <a:solidFill>
                   <a:srgbClr val="000000"/>
                 </a:solidFill>
@@ -36913,7 +36913,7 @@
               <a:t>Case 2 : </a:t>
             </a:r>
             <a:r>
-              <a:rPr lang="fr-FR" sz="2100" b="1" strike="noStrike" dirty="0" err="1">
+              <a:rPr lang="fr-FR" sz="1800" b="1" strike="noStrike" dirty="0" err="1">
                 <a:solidFill>
                   <a:srgbClr val="000000"/>
                 </a:solidFill>
@@ -36925,7 +36925,7 @@
               <a:t>What</a:t>
             </a:r>
             <a:r>
-              <a:rPr lang="fr-FR" sz="2100" b="1" strike="noStrike" dirty="0">
+              <a:rPr lang="fr-FR" sz="1800" b="1" strike="noStrike" dirty="0">
                 <a:solidFill>
                   <a:srgbClr val="000000"/>
                 </a:solidFill>
@@ -36937,7 +36937,7 @@
               <a:t> </a:t>
             </a:r>
             <a:r>
-              <a:rPr lang="fr-FR" sz="2100" b="1" strike="noStrike" dirty="0" err="1">
+              <a:rPr lang="fr-FR" sz="1800" b="1" strike="noStrike" dirty="0" err="1">
                 <a:solidFill>
                   <a:srgbClr val="000000"/>
                 </a:solidFill>
@@ -36949,7 +36949,7 @@
               <a:t>is</a:t>
             </a:r>
             <a:r>
-              <a:rPr lang="fr-FR" sz="2100" b="1" strike="noStrike" dirty="0">
+              <a:rPr lang="fr-FR" sz="1800" b="1" strike="noStrike" dirty="0">
                 <a:solidFill>
                   <a:srgbClr val="000000"/>
                 </a:solidFill>
@@ -36961,7 +36961,7 @@
               <a:t> the </a:t>
             </a:r>
             <a:r>
-              <a:rPr lang="fr-FR" sz="2100" b="1" strike="noStrike" dirty="0" err="1">
+              <a:rPr lang="fr-FR" sz="1800" b="1" strike="noStrike" dirty="0" err="1">
                 <a:solidFill>
                   <a:srgbClr val="000000"/>
                 </a:solidFill>
@@ -36973,7 +36973,7 @@
               <a:t>worst</a:t>
             </a:r>
             <a:r>
-              <a:rPr lang="fr-FR" sz="2100" b="1" strike="noStrike" dirty="0">
+              <a:rPr lang="fr-FR" sz="1800" b="1" strike="noStrike" dirty="0">
                 <a:solidFill>
                   <a:srgbClr val="000000"/>
                 </a:solidFill>
@@ -36985,7 +36985,7 @@
               <a:t> match of </a:t>
             </a:r>
             <a:r>
-              <a:rPr lang="fr-FR" sz="2100" b="1" strike="noStrike" dirty="0" err="1">
+              <a:rPr lang="fr-FR" sz="1800" b="1" strike="noStrike" dirty="0" err="1">
                 <a:solidFill>
                   <a:srgbClr val="000000"/>
                 </a:solidFill>
@@ -36997,7 +36997,7 @@
               <a:t>this</a:t>
             </a:r>
             <a:r>
-              <a:rPr lang="fr-FR" sz="2100" b="1" strike="noStrike" dirty="0">
+              <a:rPr lang="fr-FR" sz="1800" b="1" strike="noStrike" dirty="0">
                 <a:solidFill>
                   <a:srgbClr val="000000"/>
                 </a:solidFill>
@@ -37009,7 +37009,7 @@
               <a:t> </a:t>
             </a:r>
             <a:r>
-              <a:rPr lang="fr-FR" sz="2100" b="1" strike="noStrike" dirty="0" err="1">
+              <a:rPr lang="fr-FR" sz="1800" b="1" strike="noStrike" dirty="0" err="1">
                 <a:solidFill>
                   <a:srgbClr val="000000"/>
                 </a:solidFill>
@@ -37021,11 +37021,11 @@
               <a:t>query</a:t>
             </a:r>
             <a:r>
-              <a:rPr lang="fr-FR" sz="2100" b="1" dirty="0"/>
+              <a:rPr lang="fr-FR" sz="1800" b="1" dirty="0"/>
               <a:t> </a:t>
             </a:r>
             <a:r>
-              <a:rPr lang="fr-FR" sz="2100" b="1" strike="noStrike" dirty="0" err="1">
+              <a:rPr lang="fr-FR" sz="1800" b="1" strike="noStrike" dirty="0" err="1">
                 <a:solidFill>
                   <a:srgbClr val="000000"/>
                 </a:solidFill>
@@ -37037,7 +37037,7 @@
               <a:t>using</a:t>
             </a:r>
             <a:r>
-              <a:rPr lang="fr-FR" sz="2100" b="1" strike="noStrike" dirty="0">
+              <a:rPr lang="fr-FR" sz="1800" b="1" strike="noStrike" dirty="0">
                 <a:solidFill>
                   <a:srgbClr val="000000"/>
                 </a:solidFill>
@@ -37049,7 +37049,7 @@
               <a:t> a </a:t>
             </a:r>
             <a:r>
-              <a:rPr lang="fr-FR" sz="2100" b="1" strike="noStrike" dirty="0" err="1">
+              <a:rPr lang="fr-FR" sz="1800" b="1" strike="noStrike" dirty="0" err="1">
                 <a:solidFill>
                   <a:srgbClr val="000000"/>
                 </a:solidFill>
@@ -37061,7 +37061,7 @@
               <a:t>normalized</a:t>
             </a:r>
             <a:r>
-              <a:rPr lang="fr-FR" sz="2100" b="1" strike="noStrike" dirty="0">
+              <a:rPr lang="fr-FR" sz="1800" b="1" strike="noStrike" dirty="0">
                 <a:solidFill>
                   <a:srgbClr val="000000"/>
                 </a:solidFill>
@@ -37072,7 +37072,7 @@
               </a:rPr>
               <a:t> distance?</a:t>
             </a:r>
-            <a:endParaRPr sz="2100" b="0" strike="noStrike" dirty="0">
+            <a:endParaRPr sz="1800" b="0" strike="noStrike" dirty="0">
               <a:solidFill>
                 <a:srgbClr val="000000"/>
               </a:solidFill>
@@ -37100,8 +37100,8 @@
         </p:blipFill>
         <p:spPr>
           <a:xfrm>
-            <a:off x="304800" y="1622032"/>
-            <a:ext cx="8531998" cy="3436723"/>
+            <a:off x="0" y="1347104"/>
+            <a:ext cx="9143520" cy="3804556"/>
           </a:xfrm>
           <a:prstGeom prst="rect">
             <a:avLst/>
@@ -37274,8 +37274,8 @@
         </p:blipFill>
         <p:spPr>
           <a:xfrm>
-            <a:off x="585876" y="1615501"/>
-            <a:ext cx="7332120" cy="3527999"/>
+            <a:off x="351064" y="1404257"/>
+            <a:ext cx="7870372" cy="3739243"/>
           </a:xfrm>
           <a:prstGeom prst="rect">
             <a:avLst/>
@@ -37294,7 +37294,7 @@
         </p:nvSpPr>
         <p:spPr>
           <a:xfrm>
-            <a:off x="288000" y="1080000"/>
+            <a:off x="288000" y="982032"/>
             <a:ext cx="8711640" cy="359640"/>
           </a:xfrm>
           <a:prstGeom prst="rect">

</xml_diff>